<commit_message>
alteracoes e inclusao do eap e escopo
</commit_message>
<xml_diff>
--- a/Radar_Ultrasonico.pptx
+++ b/Radar_Ultrasonico.pptx
@@ -6,19 +6,16 @@
   </p:sldMasterIdLst>
   <p:sldIdLst>
     <p:sldId id="256" r:id="rId2"/>
-    <p:sldId id="262" r:id="rId3"/>
-    <p:sldId id="263" r:id="rId4"/>
-    <p:sldId id="276" r:id="rId5"/>
-    <p:sldId id="277" r:id="rId6"/>
+    <p:sldId id="263" r:id="rId3"/>
+    <p:sldId id="276" r:id="rId4"/>
+    <p:sldId id="277" r:id="rId5"/>
+    <p:sldId id="283" r:id="rId6"/>
     <p:sldId id="278" r:id="rId7"/>
     <p:sldId id="279" r:id="rId8"/>
     <p:sldId id="280" r:id="rId9"/>
     <p:sldId id="281" r:id="rId10"/>
     <p:sldId id="282" r:id="rId11"/>
-    <p:sldId id="283" r:id="rId12"/>
-    <p:sldId id="284" r:id="rId13"/>
-    <p:sldId id="285" r:id="rId14"/>
-    <p:sldId id="287" r:id="rId15"/>
+    <p:sldId id="284" r:id="rId12"/>
   </p:sldIdLst>
   <p:sldSz cx="12192000" cy="6858000"/>
   <p:notesSz cx="6858000" cy="9144000"/>
@@ -119,7 +116,7 @@
   </p:defaultTextStyle>
   <p:extLst>
     <p:ext uri="{EFAFB233-063F-42B5-8137-9DF3F51BA10A}">
-      <p15:sldGuideLst xmlns="" xmlns:p15="http://schemas.microsoft.com/office/powerpoint/2012/main"/>
+      <p15:sldGuideLst xmlns:p15="http://schemas.microsoft.com/office/powerpoint/2012/main"/>
     </p:ext>
   </p:extLst>
 </p:presentation>
@@ -262,7 +259,7 @@
           <a:p>
             <a:fld id="{6F384AE7-0112-4A81-9F7E-572F3EEA1973}" type="datetimeFigureOut">
               <a:rPr lang="pt-BR" smtClean="0"/>
-              <a:t>17/05/2017</a:t>
+              <a:t>31/05/2017</a:t>
             </a:fld>
             <a:endParaRPr lang="pt-BR"/>
           </a:p>
@@ -549,7 +546,7 @@
           <a:p>
             <a:fld id="{6F384AE7-0112-4A81-9F7E-572F3EEA1973}" type="datetimeFigureOut">
               <a:rPr lang="pt-BR" smtClean="0"/>
-              <a:t>17/05/2017</a:t>
+              <a:t>31/05/2017</a:t>
             </a:fld>
             <a:endParaRPr lang="pt-BR"/>
           </a:p>
@@ -741,7 +738,7 @@
           <a:p>
             <a:fld id="{6F384AE7-0112-4A81-9F7E-572F3EEA1973}" type="datetimeFigureOut">
               <a:rPr lang="pt-BR" smtClean="0"/>
-              <a:t>17/05/2017</a:t>
+              <a:t>31/05/2017</a:t>
             </a:fld>
             <a:endParaRPr lang="pt-BR"/>
           </a:p>
@@ -1002,7 +999,7 @@
           <a:p>
             <a:fld id="{6F384AE7-0112-4A81-9F7E-572F3EEA1973}" type="datetimeFigureOut">
               <a:rPr lang="pt-BR" smtClean="0"/>
-              <a:t>17/05/2017</a:t>
+              <a:t>31/05/2017</a:t>
             </a:fld>
             <a:endParaRPr lang="pt-BR"/>
           </a:p>
@@ -1426,7 +1423,7 @@
           <a:p>
             <a:fld id="{6F384AE7-0112-4A81-9F7E-572F3EEA1973}" type="datetimeFigureOut">
               <a:rPr lang="pt-BR" smtClean="0"/>
-              <a:t>17/05/2017</a:t>
+              <a:t>31/05/2017</a:t>
             </a:fld>
             <a:endParaRPr lang="pt-BR"/>
           </a:p>
@@ -1972,7 +1969,7 @@
           <a:p>
             <a:fld id="{6F384AE7-0112-4A81-9F7E-572F3EEA1973}" type="datetimeFigureOut">
               <a:rPr lang="pt-BR" smtClean="0"/>
-              <a:t>17/05/2017</a:t>
+              <a:t>31/05/2017</a:t>
             </a:fld>
             <a:endParaRPr lang="pt-BR"/>
           </a:p>
@@ -2812,7 +2809,7 @@
           <a:p>
             <a:fld id="{6F384AE7-0112-4A81-9F7E-572F3EEA1973}" type="datetimeFigureOut">
               <a:rPr lang="pt-BR" smtClean="0"/>
-              <a:t>17/05/2017</a:t>
+              <a:t>31/05/2017</a:t>
             </a:fld>
             <a:endParaRPr lang="pt-BR"/>
           </a:p>
@@ -2982,7 +2979,7 @@
           <a:p>
             <a:fld id="{6F384AE7-0112-4A81-9F7E-572F3EEA1973}" type="datetimeFigureOut">
               <a:rPr lang="pt-BR" smtClean="0"/>
-              <a:t>17/05/2017</a:t>
+              <a:t>31/05/2017</a:t>
             </a:fld>
             <a:endParaRPr lang="pt-BR"/>
           </a:p>
@@ -3166,7 +3163,7 @@
           <a:p>
             <a:fld id="{6F384AE7-0112-4A81-9F7E-572F3EEA1973}" type="datetimeFigureOut">
               <a:rPr lang="pt-BR" smtClean="0"/>
-              <a:t>17/05/2017</a:t>
+              <a:t>31/05/2017</a:t>
             </a:fld>
             <a:endParaRPr lang="pt-BR"/>
           </a:p>
@@ -3336,7 +3333,7 @@
           <a:p>
             <a:fld id="{6F384AE7-0112-4A81-9F7E-572F3EEA1973}" type="datetimeFigureOut">
               <a:rPr lang="pt-BR" smtClean="0"/>
-              <a:t>17/05/2017</a:t>
+              <a:t>31/05/2017</a:t>
             </a:fld>
             <a:endParaRPr lang="pt-BR"/>
           </a:p>
@@ -3584,7 +3581,7 @@
           <a:p>
             <a:fld id="{6F384AE7-0112-4A81-9F7E-572F3EEA1973}" type="datetimeFigureOut">
               <a:rPr lang="pt-BR" smtClean="0"/>
-              <a:t>17/05/2017</a:t>
+              <a:t>31/05/2017</a:t>
             </a:fld>
             <a:endParaRPr lang="pt-BR"/>
           </a:p>
@@ -3821,7 +3818,7 @@
           <a:p>
             <a:fld id="{6F384AE7-0112-4A81-9F7E-572F3EEA1973}" type="datetimeFigureOut">
               <a:rPr lang="pt-BR" smtClean="0"/>
-              <a:t>17/05/2017</a:t>
+              <a:t>31/05/2017</a:t>
             </a:fld>
             <a:endParaRPr lang="pt-BR"/>
           </a:p>
@@ -4194,7 +4191,7 @@
           <a:p>
             <a:fld id="{6F384AE7-0112-4A81-9F7E-572F3EEA1973}" type="datetimeFigureOut">
               <a:rPr lang="pt-BR" smtClean="0"/>
-              <a:t>17/05/2017</a:t>
+              <a:t>31/05/2017</a:t>
             </a:fld>
             <a:endParaRPr lang="pt-BR"/>
           </a:p>
@@ -4312,7 +4309,7 @@
           <a:p>
             <a:fld id="{6F384AE7-0112-4A81-9F7E-572F3EEA1973}" type="datetimeFigureOut">
               <a:rPr lang="pt-BR" smtClean="0"/>
-              <a:t>17/05/2017</a:t>
+              <a:t>31/05/2017</a:t>
             </a:fld>
             <a:endParaRPr lang="pt-BR"/>
           </a:p>
@@ -4407,7 +4404,7 @@
           <a:p>
             <a:fld id="{6F384AE7-0112-4A81-9F7E-572F3EEA1973}" type="datetimeFigureOut">
               <a:rPr lang="pt-BR" smtClean="0"/>
-              <a:t>17/05/2017</a:t>
+              <a:t>31/05/2017</a:t>
             </a:fld>
             <a:endParaRPr lang="pt-BR"/>
           </a:p>
@@ -4658,7 +4655,7 @@
           <a:p>
             <a:fld id="{6F384AE7-0112-4A81-9F7E-572F3EEA1973}" type="datetimeFigureOut">
               <a:rPr lang="pt-BR" smtClean="0"/>
-              <a:t>17/05/2017</a:t>
+              <a:t>31/05/2017</a:t>
             </a:fld>
             <a:endParaRPr lang="pt-BR"/>
           </a:p>
@@ -4945,7 +4942,7 @@
           <a:p>
             <a:fld id="{6F384AE7-0112-4A81-9F7E-572F3EEA1973}" type="datetimeFigureOut">
               <a:rPr lang="pt-BR" smtClean="0"/>
-              <a:t>17/05/2017</a:t>
+              <a:t>31/05/2017</a:t>
             </a:fld>
             <a:endParaRPr lang="pt-BR"/>
           </a:p>
@@ -5158,7 +5155,7 @@
           <a:p>
             <a:fld id="{6F384AE7-0112-4A81-9F7E-572F3EEA1973}" type="datetimeFigureOut">
               <a:rPr lang="pt-BR" smtClean="0"/>
-              <a:t>17/05/2017</a:t>
+              <a:t>31/05/2017</a:t>
             </a:fld>
             <a:endParaRPr lang="pt-BR"/>
           </a:p>
@@ -5657,45 +5654,45 @@
         </p:spPr>
         <p:txBody>
           <a:bodyPr>
-            <a:normAutofit fontScale="90000"/>
+            <a:normAutofit/>
           </a:bodyPr>
           <a:lstStyle/>
           <a:p>
             <a:r>
-              <a:rPr lang="pt-BR" dirty="0">
+              <a:rPr lang="pt-BR" sz="4000" dirty="0">
                 <a:effectLst/>
               </a:rPr>
               <a:t>RADAR ULTRASÔNICO </a:t>
             </a:r>
             <a:br>
-              <a:rPr lang="pt-BR" dirty="0">
+              <a:rPr lang="pt-BR" sz="4000" dirty="0">
                 <a:effectLst/>
               </a:rPr>
             </a:br>
             <a:r>
-              <a:rPr lang="pt-BR" dirty="0">
+              <a:rPr lang="pt-BR" sz="4000" dirty="0">
                 <a:effectLst/>
               </a:rPr>
               <a:t>MILITAR - MARINHA DO BRASIL </a:t>
             </a:r>
             <a:br>
-              <a:rPr lang="pt-BR" dirty="0">
+              <a:rPr lang="pt-BR" sz="4000" dirty="0">
                 <a:effectLst/>
               </a:rPr>
             </a:br>
             <a:r>
-              <a:rPr lang="pt-BR" dirty="0">
+              <a:rPr lang="pt-BR" sz="4000" dirty="0">
                 <a:effectLst/>
               </a:rPr>
               <a:t>  (F LIBERAL / F-43)</a:t>
             </a:r>
             <a:br>
-              <a:rPr lang="pt-BR" dirty="0">
+              <a:rPr lang="pt-BR" sz="4000" dirty="0">
                 <a:effectLst/>
               </a:rPr>
             </a:br>
             <a:r>
-              <a:rPr lang="pt-BR" dirty="0">
+              <a:rPr lang="pt-BR" sz="4000" dirty="0">
                 <a:effectLst/>
               </a:rPr>
               <a:t> </a:t>
@@ -5756,16 +5753,12 @@
           <a:p>
             <a:pPr algn="l"/>
             <a:r>
-              <a:rPr lang="pt-BR" dirty="0" err="1" smtClean="0"/>
-              <a:t>Marllon</a:t>
-            </a:r>
-            <a:r>
-              <a:rPr lang="pt-BR" dirty="0" smtClean="0"/>
-              <a:t> </a:t>
+              <a:rPr lang="pt-BR" dirty="0" err="1"/>
+              <a:t>Marllom</a:t>
             </a:r>
             <a:r>
               <a:rPr lang="pt-BR" dirty="0"/>
-              <a:t>Moraes</a:t>
+              <a:t> Moraes</a:t>
             </a:r>
           </a:p>
           <a:p>
@@ -5791,13 +5784,6 @@
   <p:clrMapOvr>
     <a:masterClrMapping/>
   </p:clrMapOvr>
-  <p:timing>
-    <p:tnLst>
-      <p:par>
-        <p:cTn id="1" dur="indefinite" restart="never" nodeType="tmRoot"/>
-      </p:par>
-    </p:tnLst>
-  </p:timing>
 </p:sld>
 </file>
 
@@ -5841,11 +5827,20 @@
           <a:lstStyle/>
           <a:p>
             <a:r>
-              <a:rPr lang="en-US" dirty="0">
+              <a:rPr lang="en-US" sz="2800" dirty="0">
                 <a:effectLst/>
               </a:rPr>
-              <a:t>8. RISCOS</a:t>
-            </a:r>
+              <a:t>9. </a:t>
+            </a:r>
+            <a:r>
+              <a:rPr lang="pt-BR" sz="2800" dirty="0">
+                <a:effectLst/>
+              </a:rPr>
+              <a:t>ENTREGAS E CRITÉRIOS DE ACEITAÇÃO</a:t>
+            </a:r>
+            <a:endParaRPr lang="en-US" sz="2800" dirty="0">
+              <a:effectLst/>
+            </a:endParaRPr>
           </a:p>
         </p:txBody>
       </p:sp>
@@ -5875,19 +5870,67 @@
               <a:rPr lang="pt-BR" dirty="0">
                 <a:effectLst/>
               </a:rPr>
-              <a:t>Devido à complexidade do projeto, a implementação de uma solução adequada pode </a:t>
-            </a:r>
-            <a:r>
-              <a:rPr lang="pt-BR" sz="2400" dirty="0">
-                <a:effectLst/>
-              </a:rPr>
-              <a:t>ESTENDER O PRAZO</a:t>
-            </a:r>
+              <a:t>A entrega será em 3(três) etapas, e será somente aceito mediante conclusão da etapa anterior. As etapas são aqui descritas de acordo com as características:</a:t>
+            </a:r>
+          </a:p>
+          <a:p>
+            <a:pPr marL="671513" indent="0">
+              <a:buNone/>
+            </a:pPr>
             <a:r>
               <a:rPr lang="pt-BR" dirty="0">
                 <a:effectLst/>
               </a:rPr>
-              <a:t> de entrega.</a:t>
+              <a:t>Etapa 1</a:t>
+            </a:r>
+          </a:p>
+          <a:p>
+            <a:pPr marL="900113" lvl="0"/>
+            <a:r>
+              <a:rPr lang="pt-BR" dirty="0">
+                <a:effectLst/>
+              </a:rPr>
+              <a:t>Itens I e II</a:t>
+            </a:r>
+          </a:p>
+          <a:p>
+            <a:pPr marL="671513" indent="0">
+              <a:buNone/>
+            </a:pPr>
+            <a:r>
+              <a:rPr lang="pt-BR" dirty="0">
+                <a:effectLst/>
+              </a:rPr>
+              <a:t>Etapa 2</a:t>
+            </a:r>
+          </a:p>
+          <a:p>
+            <a:pPr marL="900113" lvl="0"/>
+            <a:r>
+              <a:rPr lang="pt-BR" dirty="0">
+                <a:effectLst/>
+              </a:rPr>
+              <a:t>Itens III e IV </a:t>
+            </a:r>
+          </a:p>
+          <a:p>
+            <a:pPr marL="671513" indent="0">
+              <a:buNone/>
+            </a:pPr>
+            <a:r>
+              <a:rPr lang="pt-BR" dirty="0">
+                <a:effectLst/>
+              </a:rPr>
+              <a:t>Etapa 3 </a:t>
+            </a:r>
+          </a:p>
+          <a:p>
+            <a:pPr marL="900113" lvl="0"/>
+            <a:r>
+              <a:rPr lang="pt-BR" dirty="0">
+                <a:effectLst/>
+              </a:rPr>
+              <a:t>Item V</a:t>
             </a:r>
           </a:p>
           <a:p>
@@ -5910,13 +5953,6 @@
   <p:clrMapOvr>
     <a:masterClrMapping/>
   </p:clrMapOvr>
-  <p:timing>
-    <p:tnLst>
-      <p:par>
-        <p:cTn id="1" dur="indefinite" restart="never" nodeType="tmRoot"/>
-      </p:par>
-    </p:tnLst>
-  </p:timing>
 </p:sld>
 </file>
 
@@ -5949,250 +5985,26 @@
         </p:nvSpPr>
         <p:spPr>
           <a:xfrm>
-            <a:off x="913795" y="609600"/>
-            <a:ext cx="10353761" cy="886691"/>
+            <a:off x="913795" y="193964"/>
+            <a:ext cx="10353761" cy="484909"/>
           </a:xfrm>
         </p:spPr>
         <p:txBody>
           <a:bodyPr>
-            <a:normAutofit/>
+            <a:normAutofit fontScale="90000"/>
           </a:bodyPr>
           <a:lstStyle/>
           <a:p>
             <a:r>
-              <a:rPr lang="en-US" dirty="0">
-                <a:effectLst/>
-              </a:rPr>
-              <a:t>9. PRAZO E INVESTIMENTO</a:t>
-            </a:r>
-          </a:p>
-        </p:txBody>
-      </p:sp>
-      <p:sp>
-        <p:nvSpPr>
-          <p:cNvPr id="3" name="Espaço Reservado para Conteúdo 2"/>
-          <p:cNvSpPr>
-            <a:spLocks noGrp="1"/>
-          </p:cNvSpPr>
-          <p:nvPr>
-            <p:ph idx="1"/>
-          </p:nvPr>
-        </p:nvSpPr>
-        <p:spPr>
-          <a:xfrm>
-            <a:off x="838199" y="1690255"/>
-            <a:ext cx="10429357" cy="4849089"/>
-          </a:xfrm>
-        </p:spPr>
-        <p:txBody>
-          <a:bodyPr>
-            <a:normAutofit/>
-          </a:bodyPr>
-          <a:lstStyle/>
-          <a:p>
-            <a:r>
-              <a:rPr lang="pt-BR" sz="2800" dirty="0">
-                <a:effectLst/>
-              </a:rPr>
-              <a:t>Prazo: 30 de junho de 2017</a:t>
-            </a:r>
-          </a:p>
-          <a:p>
-            <a:r>
-              <a:rPr lang="pt-BR" sz="2800" dirty="0">
-                <a:effectLst/>
-              </a:rPr>
-              <a:t>Investimento – R$ 200000,00</a:t>
-            </a:r>
-          </a:p>
-          <a:p>
-            <a:pPr marL="0" indent="0">
-              <a:buNone/>
-            </a:pPr>
-            <a:endParaRPr lang="pt-BR" dirty="0">
-              <a:effectLst/>
-            </a:endParaRPr>
-          </a:p>
-        </p:txBody>
-      </p:sp>
-    </p:spTree>
-    <p:extLst>
-      <p:ext uri="{BB962C8B-B14F-4D97-AF65-F5344CB8AC3E}">
-        <p14:creationId xmlns:p14="http://schemas.microsoft.com/office/powerpoint/2010/main" val="1788794622"/>
-      </p:ext>
-    </p:extLst>
-  </p:cSld>
-  <p:clrMapOvr>
-    <a:masterClrMapping/>
-  </p:clrMapOvr>
-  <p:timing>
-    <p:tnLst>
-      <p:par>
-        <p:cTn id="1" dur="indefinite" restart="never" nodeType="tmRoot"/>
-      </p:par>
-    </p:tnLst>
-  </p:timing>
-</p:sld>
-</file>
-
-<file path=ppt/slides/slide12.xml><?xml version="1.0" encoding="utf-8"?>
-<p:sld xmlns:a="http://schemas.openxmlformats.org/drawingml/2006/main" xmlns:r="http://schemas.openxmlformats.org/officeDocument/2006/relationships" xmlns:p="http://schemas.openxmlformats.org/presentationml/2006/main">
-  <p:cSld>
-    <p:spTree>
-      <p:nvGrpSpPr>
-        <p:cNvPr id="1" name=""/>
-        <p:cNvGrpSpPr/>
-        <p:nvPr/>
-      </p:nvGrpSpPr>
-      <p:grpSpPr>
-        <a:xfrm>
-          <a:off x="0" y="0"/>
-          <a:ext cx="0" cy="0"/>
-          <a:chOff x="0" y="0"/>
-          <a:chExt cx="0" cy="0"/>
-        </a:xfrm>
-      </p:grpSpPr>
-      <p:sp>
-        <p:nvSpPr>
-          <p:cNvPr id="2" name="Título 1"/>
-          <p:cNvSpPr>
-            <a:spLocks noGrp="1"/>
-          </p:cNvSpPr>
-          <p:nvPr>
-            <p:ph type="title"/>
-          </p:nvPr>
-        </p:nvSpPr>
-        <p:spPr>
-          <a:xfrm>
-            <a:off x="913795" y="609600"/>
-            <a:ext cx="10353761" cy="886691"/>
-          </a:xfrm>
-        </p:spPr>
-        <p:txBody>
-          <a:bodyPr>
-            <a:normAutofit/>
-          </a:bodyPr>
-          <a:lstStyle/>
-          <a:p>
-            <a:r>
-              <a:rPr lang="en-US" dirty="0">
-                <a:effectLst/>
-              </a:rPr>
-              <a:t>10. PLANO DE AQUISIÇÕES</a:t>
-            </a:r>
-          </a:p>
-        </p:txBody>
-      </p:sp>
-      <p:sp>
-        <p:nvSpPr>
-          <p:cNvPr id="3" name="Espaço Reservado para Conteúdo 2"/>
-          <p:cNvSpPr>
-            <a:spLocks noGrp="1"/>
-          </p:cNvSpPr>
-          <p:nvPr>
-            <p:ph idx="1"/>
-          </p:nvPr>
-        </p:nvSpPr>
-        <p:spPr>
-          <a:xfrm>
-            <a:off x="838199" y="1690255"/>
-            <a:ext cx="10429357" cy="4849089"/>
-          </a:xfrm>
-        </p:spPr>
-        <p:txBody>
-          <a:bodyPr>
-            <a:normAutofit/>
-          </a:bodyPr>
-          <a:lstStyle/>
-          <a:p>
-            <a:r>
-              <a:rPr lang="pt-BR" sz="2800" dirty="0">
-                <a:effectLst/>
-              </a:rPr>
-              <a:t>Sem  Aquisições </a:t>
-            </a:r>
-          </a:p>
-          <a:p>
-            <a:pPr marL="0" indent="0">
-              <a:buNone/>
-            </a:pPr>
-            <a:endParaRPr lang="pt-BR" dirty="0">
-              <a:effectLst/>
-            </a:endParaRPr>
-          </a:p>
-        </p:txBody>
-      </p:sp>
-    </p:spTree>
-    <p:extLst>
-      <p:ext uri="{BB962C8B-B14F-4D97-AF65-F5344CB8AC3E}">
-        <p14:creationId xmlns:p14="http://schemas.microsoft.com/office/powerpoint/2010/main" val="3414644560"/>
-      </p:ext>
-    </p:extLst>
-  </p:cSld>
-  <p:clrMapOvr>
-    <a:masterClrMapping/>
-  </p:clrMapOvr>
-  <p:timing>
-    <p:tnLst>
-      <p:par>
-        <p:cTn id="1" dur="indefinite" restart="never" nodeType="tmRoot"/>
-      </p:par>
-    </p:tnLst>
-  </p:timing>
-</p:sld>
-</file>
-
-<file path=ppt/slides/slide13.xml><?xml version="1.0" encoding="utf-8"?>
-<p:sld xmlns:a="http://schemas.openxmlformats.org/drawingml/2006/main" xmlns:r="http://schemas.openxmlformats.org/officeDocument/2006/relationships" xmlns:p="http://schemas.openxmlformats.org/presentationml/2006/main">
-  <p:cSld>
-    <p:spTree>
-      <p:nvGrpSpPr>
-        <p:cNvPr id="1" name=""/>
-        <p:cNvGrpSpPr/>
-        <p:nvPr/>
-      </p:nvGrpSpPr>
-      <p:grpSpPr>
-        <a:xfrm>
-          <a:off x="0" y="0"/>
-          <a:ext cx="0" cy="0"/>
-          <a:chOff x="0" y="0"/>
-          <a:chExt cx="0" cy="0"/>
-        </a:xfrm>
-      </p:grpSpPr>
-      <p:sp>
-        <p:nvSpPr>
-          <p:cNvPr id="2" name="Título 1"/>
-          <p:cNvSpPr>
-            <a:spLocks noGrp="1"/>
-          </p:cNvSpPr>
-          <p:nvPr>
-            <p:ph type="title"/>
-          </p:nvPr>
-        </p:nvSpPr>
-        <p:spPr>
-          <a:xfrm>
-            <a:off x="913795" y="609600"/>
-            <a:ext cx="10353761" cy="886691"/>
-          </a:xfrm>
-        </p:spPr>
-        <p:txBody>
-          <a:bodyPr>
-            <a:normAutofit/>
-          </a:bodyPr>
-          <a:lstStyle/>
-          <a:p>
-            <a:r>
-              <a:rPr lang="en-US" dirty="0">
-                <a:effectLst/>
-              </a:rPr>
-              <a:t>11. PRINCIPAIS ETAPAS</a:t>
+              <a:rPr lang="pt-BR" dirty="0"/>
+              <a:t>EAP – projeto RADAR ULTRASSÔNICO</a:t>
             </a:r>
           </a:p>
         </p:txBody>
       </p:sp>
       <p:pic>
         <p:nvPicPr>
-          <p:cNvPr id="6" name="Espaço Reservado para Conteúdo 5"/>
+          <p:cNvPr id="5" name="Espaço Reservado para Conteúdo 4"/>
           <p:cNvPicPr>
             <a:picLocks noGrp="1" noChangeAspect="1"/>
           </p:cNvPicPr>
@@ -6214,744 +6026,21 @@
         </p:blipFill>
         <p:spPr>
           <a:xfrm>
-            <a:off x="1149927" y="1496292"/>
-            <a:ext cx="9892146" cy="5264726"/>
+            <a:off x="332509" y="955964"/>
+            <a:ext cx="11526981" cy="5708071"/>
           </a:xfrm>
         </p:spPr>
       </p:pic>
     </p:spTree>
     <p:extLst>
       <p:ext uri="{BB962C8B-B14F-4D97-AF65-F5344CB8AC3E}">
-        <p14:creationId xmlns:p14="http://schemas.microsoft.com/office/powerpoint/2010/main" val="2881580679"/>
+        <p14:creationId xmlns:p14="http://schemas.microsoft.com/office/powerpoint/2010/main" val="3519230097"/>
       </p:ext>
     </p:extLst>
   </p:cSld>
   <p:clrMapOvr>
     <a:masterClrMapping/>
   </p:clrMapOvr>
-  <p:timing>
-    <p:tnLst>
-      <p:par>
-        <p:cTn id="1" dur="indefinite" restart="never" nodeType="tmRoot"/>
-      </p:par>
-    </p:tnLst>
-  </p:timing>
-</p:sld>
-</file>
-
-<file path=ppt/slides/slide14.xml><?xml version="1.0" encoding="utf-8"?>
-<p:sld xmlns:a="http://schemas.openxmlformats.org/drawingml/2006/main" xmlns:r="http://schemas.openxmlformats.org/officeDocument/2006/relationships" xmlns:p="http://schemas.openxmlformats.org/presentationml/2006/main">
-  <p:cSld>
-    <p:spTree>
-      <p:nvGrpSpPr>
-        <p:cNvPr id="1" name=""/>
-        <p:cNvGrpSpPr/>
-        <p:nvPr/>
-      </p:nvGrpSpPr>
-      <p:grpSpPr>
-        <a:xfrm>
-          <a:off x="0" y="0"/>
-          <a:ext cx="0" cy="0"/>
-          <a:chOff x="0" y="0"/>
-          <a:chExt cx="0" cy="0"/>
-        </a:xfrm>
-      </p:grpSpPr>
-      <p:sp>
-        <p:nvSpPr>
-          <p:cNvPr id="2" name="Título 1"/>
-          <p:cNvSpPr>
-            <a:spLocks noGrp="1"/>
-          </p:cNvSpPr>
-          <p:nvPr>
-            <p:ph type="title"/>
-          </p:nvPr>
-        </p:nvSpPr>
-        <p:spPr>
-          <a:xfrm>
-            <a:off x="913795" y="609600"/>
-            <a:ext cx="10353761" cy="886691"/>
-          </a:xfrm>
-        </p:spPr>
-        <p:txBody>
-          <a:bodyPr>
-            <a:normAutofit/>
-          </a:bodyPr>
-          <a:lstStyle/>
-          <a:p>
-            <a:r>
-              <a:rPr lang="en-US" dirty="0">
-                <a:effectLst/>
-              </a:rPr>
-              <a:t>12. RELAÇÃO DAS PARTES INTERESSADAS</a:t>
-            </a:r>
-            <a:endParaRPr lang="pt-BR" dirty="0"/>
-          </a:p>
-        </p:txBody>
-      </p:sp>
-      <p:graphicFrame>
-        <p:nvGraphicFramePr>
-          <p:cNvPr id="8" name="Espaço Reservado para Conteúdo 7"/>
-          <p:cNvGraphicFramePr>
-            <a:graphicFrameLocks noGrp="1"/>
-          </p:cNvGraphicFramePr>
-          <p:nvPr>
-            <p:ph idx="1"/>
-            <p:extLst>
-              <p:ext uri="{D42A27DB-BD31-4B8C-83A1-F6EECF244321}">
-                <p14:modId xmlns:p14="http://schemas.microsoft.com/office/powerpoint/2010/main" val="670013538"/>
-              </p:ext>
-            </p:extLst>
-          </p:nvPr>
-        </p:nvGraphicFramePr>
-        <p:xfrm>
-          <a:off x="914400" y="2095500"/>
-          <a:ext cx="10353675" cy="2225040"/>
-        </p:xfrm>
-        <a:graphic>
-          <a:graphicData uri="http://schemas.openxmlformats.org/drawingml/2006/table">
-            <a:tbl>
-              <a:tblPr firstRow="1" bandRow="1">
-                <a:tableStyleId>{073A0DAA-6AF3-43AB-8588-CEC1D06C72B9}</a:tableStyleId>
-              </a:tblPr>
-              <a:tblGrid>
-                <a:gridCol w="4405745">
-                  <a:extLst>
-                    <a:ext uri="{9D8B030D-6E8A-4147-A177-3AD203B41FA5}">
-                      <a16:colId xmlns="" xmlns:a16="http://schemas.microsoft.com/office/drawing/2014/main" val="4016962615"/>
-                    </a:ext>
-                  </a:extLst>
-                </a:gridCol>
-                <a:gridCol w="2496705">
-                  <a:extLst>
-                    <a:ext uri="{9D8B030D-6E8A-4147-A177-3AD203B41FA5}">
-                      <a16:colId xmlns="" xmlns:a16="http://schemas.microsoft.com/office/drawing/2014/main" val="2703855522"/>
-                    </a:ext>
-                  </a:extLst>
-                </a:gridCol>
-                <a:gridCol w="3451225">
-                  <a:extLst>
-                    <a:ext uri="{9D8B030D-6E8A-4147-A177-3AD203B41FA5}">
-                      <a16:colId xmlns="" xmlns:a16="http://schemas.microsoft.com/office/drawing/2014/main" val="1595908541"/>
-                    </a:ext>
-                  </a:extLst>
-                </a:gridCol>
-              </a:tblGrid>
-              <a:tr h="370840">
-                <a:tc>
-                  <a:txBody>
-                    <a:bodyPr/>
-                    <a:lstStyle/>
-                    <a:p>
-                      <a:pPr marL="0" algn="ctr" defTabSz="914400" rtl="0" eaLnBrk="1" latinLnBrk="0" hangingPunct="1"/>
-                      <a:r>
-                        <a:rPr lang="pt-BR" sz="1800" kern="1200" dirty="0">
-                          <a:effectLst/>
-                        </a:rPr>
-                        <a:t>Nome </a:t>
-                      </a:r>
-                      <a:endParaRPr lang="pt-BR" sz="1800" kern="1200" dirty="0">
-                        <a:solidFill>
-                          <a:schemeClr val="dk1"/>
-                        </a:solidFill>
-                        <a:effectLst/>
-                        <a:latin typeface="+mn-lt"/>
-                        <a:ea typeface="+mn-ea"/>
-                        <a:cs typeface="+mn-cs"/>
-                      </a:endParaRPr>
-                    </a:p>
-                  </a:txBody>
-                  <a:tcPr/>
-                </a:tc>
-                <a:tc>
-                  <a:txBody>
-                    <a:bodyPr/>
-                    <a:lstStyle/>
-                    <a:p>
-                      <a:pPr marL="0" algn="ctr" defTabSz="914400" rtl="0" eaLnBrk="1" latinLnBrk="0" hangingPunct="1"/>
-                      <a:r>
-                        <a:rPr lang="pt-BR" sz="1800" kern="1200" dirty="0">
-                          <a:effectLst/>
-                        </a:rPr>
-                        <a:t>Cargo</a:t>
-                      </a:r>
-                      <a:endParaRPr lang="pt-BR" sz="1800" kern="1200" dirty="0">
-                        <a:solidFill>
-                          <a:schemeClr val="dk1"/>
-                        </a:solidFill>
-                        <a:effectLst/>
-                        <a:latin typeface="+mn-lt"/>
-                        <a:ea typeface="+mn-ea"/>
-                        <a:cs typeface="+mn-cs"/>
-                      </a:endParaRPr>
-                    </a:p>
-                  </a:txBody>
-                  <a:tcPr/>
-                </a:tc>
-                <a:tc>
-                  <a:txBody>
-                    <a:bodyPr/>
-                    <a:lstStyle/>
-                    <a:p>
-                      <a:pPr marL="0" algn="ctr" defTabSz="914400" rtl="0" eaLnBrk="1" latinLnBrk="0" hangingPunct="1"/>
-                      <a:r>
-                        <a:rPr lang="pt-BR" sz="1800" kern="1200" dirty="0">
-                          <a:effectLst/>
-                        </a:rPr>
-                        <a:t>Função</a:t>
-                      </a:r>
-                      <a:endParaRPr lang="pt-BR" sz="1800" kern="1200" dirty="0">
-                        <a:solidFill>
-                          <a:schemeClr val="dk1"/>
-                        </a:solidFill>
-                        <a:effectLst/>
-                        <a:latin typeface="+mn-lt"/>
-                        <a:ea typeface="+mn-ea"/>
-                        <a:cs typeface="+mn-cs"/>
-                      </a:endParaRPr>
-                    </a:p>
-                  </a:txBody>
-                  <a:tcPr/>
-                </a:tc>
-                <a:extLst>
-                  <a:ext uri="{0D108BD9-81ED-4DB2-BD59-A6C34878D82A}">
-                    <a16:rowId xmlns="" xmlns:a16="http://schemas.microsoft.com/office/drawing/2014/main" val="1304098534"/>
-                  </a:ext>
-                </a:extLst>
-              </a:tr>
-              <a:tr h="370840">
-                <a:tc>
-                  <a:txBody>
-                    <a:bodyPr/>
-                    <a:lstStyle/>
-                    <a:p>
-                      <a:pPr marL="0" algn="l" defTabSz="914400" rtl="0" eaLnBrk="1" latinLnBrk="0" hangingPunct="1"/>
-                      <a:r>
-                        <a:rPr lang="en-US" sz="1800" kern="1200" dirty="0">
-                          <a:effectLst/>
-                        </a:rPr>
-                        <a:t>Antonio Luiz Von </a:t>
-                      </a:r>
-                      <a:r>
-                        <a:rPr lang="en-US" sz="1800" kern="1200" dirty="0" err="1">
-                          <a:effectLst/>
-                        </a:rPr>
-                        <a:t>Hoonholtz</a:t>
-                      </a:r>
-                      <a:endParaRPr lang="pt-BR" sz="1800" kern="1200" dirty="0">
-                        <a:solidFill>
-                          <a:schemeClr val="dk1"/>
-                        </a:solidFill>
-                        <a:effectLst/>
-                        <a:latin typeface="+mn-lt"/>
-                        <a:ea typeface="+mn-ea"/>
-                        <a:cs typeface="+mn-cs"/>
-                      </a:endParaRPr>
-                    </a:p>
-                  </a:txBody>
-                  <a:tcPr/>
-                </a:tc>
-                <a:tc>
-                  <a:txBody>
-                    <a:bodyPr/>
-                    <a:lstStyle/>
-                    <a:p>
-                      <a:pPr marL="0" algn="ctr" defTabSz="914400" rtl="0" eaLnBrk="1" latinLnBrk="0" hangingPunct="1"/>
-                      <a:r>
-                        <a:rPr lang="en-US" sz="1800" kern="1200" dirty="0">
-                          <a:effectLst/>
-                        </a:rPr>
-                        <a:t>D.R.H</a:t>
-                      </a:r>
-                      <a:endParaRPr lang="pt-BR" sz="1800" kern="1200" dirty="0">
-                        <a:solidFill>
-                          <a:schemeClr val="dk1"/>
-                        </a:solidFill>
-                        <a:effectLst/>
-                        <a:latin typeface="+mn-lt"/>
-                        <a:ea typeface="+mn-ea"/>
-                        <a:cs typeface="+mn-cs"/>
-                      </a:endParaRPr>
-                    </a:p>
-                  </a:txBody>
-                  <a:tcPr/>
-                </a:tc>
-                <a:tc>
-                  <a:txBody>
-                    <a:bodyPr/>
-                    <a:lstStyle/>
-                    <a:p>
-                      <a:pPr marL="0" algn="ctr" defTabSz="914400" rtl="0" eaLnBrk="1" latinLnBrk="0" hangingPunct="1">
-                        <a:spcBef>
-                          <a:spcPts val="200"/>
-                        </a:spcBef>
-                        <a:spcAft>
-                          <a:spcPts val="0"/>
-                        </a:spcAft>
-                      </a:pPr>
-                      <a:r>
-                        <a:rPr lang="en-US" sz="1800" kern="1200" dirty="0" err="1">
-                          <a:effectLst/>
-                        </a:rPr>
-                        <a:t>Capitão</a:t>
-                      </a:r>
-                      <a:r>
-                        <a:rPr lang="en-US" sz="1800" kern="1200" dirty="0">
-                          <a:effectLst/>
-                        </a:rPr>
-                        <a:t> de </a:t>
-                      </a:r>
-                      <a:r>
-                        <a:rPr lang="en-US" sz="1800" kern="1200" dirty="0" err="1">
-                          <a:effectLst/>
-                        </a:rPr>
-                        <a:t>Fragata</a:t>
-                      </a:r>
-                      <a:endParaRPr lang="pt-BR" sz="1800" kern="1200" dirty="0">
-                        <a:solidFill>
-                          <a:schemeClr val="dk1"/>
-                        </a:solidFill>
-                        <a:effectLst/>
-                        <a:latin typeface="+mn-lt"/>
-                        <a:ea typeface="+mn-ea"/>
-                        <a:cs typeface="+mn-cs"/>
-                      </a:endParaRPr>
-                    </a:p>
-                  </a:txBody>
-                  <a:tcPr marL="0" marR="0" marT="0" marB="0" anchor="ctr"/>
-                </a:tc>
-                <a:extLst>
-                  <a:ext uri="{0D108BD9-81ED-4DB2-BD59-A6C34878D82A}">
-                    <a16:rowId xmlns="" xmlns:a16="http://schemas.microsoft.com/office/drawing/2014/main" val="2173879418"/>
-                  </a:ext>
-                </a:extLst>
-              </a:tr>
-              <a:tr h="370840">
-                <a:tc>
-                  <a:txBody>
-                    <a:bodyPr/>
-                    <a:lstStyle/>
-                    <a:p>
-                      <a:pPr marL="0" algn="l" defTabSz="914400" rtl="0" eaLnBrk="1" latinLnBrk="0" hangingPunct="1">
-                        <a:spcAft>
-                          <a:spcPts val="0"/>
-                        </a:spcAft>
-                      </a:pPr>
-                      <a:r>
-                        <a:rPr lang="en-US" sz="1800" kern="1200" dirty="0">
-                          <a:effectLst/>
-                        </a:rPr>
-                        <a:t>  Francisco </a:t>
-                      </a:r>
-                      <a:r>
-                        <a:rPr lang="en-US" sz="1800" kern="1200" dirty="0" err="1">
-                          <a:effectLst/>
-                        </a:rPr>
-                        <a:t>Calheiros</a:t>
-                      </a:r>
-                      <a:r>
-                        <a:rPr lang="en-US" sz="1800" kern="1200" dirty="0">
-                          <a:effectLst/>
-                        </a:rPr>
-                        <a:t> da </a:t>
-                      </a:r>
-                      <a:r>
-                        <a:rPr lang="en-US" sz="1800" kern="1200" dirty="0" err="1">
-                          <a:effectLst/>
-                        </a:rPr>
-                        <a:t>Graça</a:t>
-                      </a:r>
-                      <a:endParaRPr lang="pt-BR" sz="1800" kern="1200" dirty="0">
-                        <a:solidFill>
-                          <a:schemeClr val="dk1"/>
-                        </a:solidFill>
-                        <a:effectLst/>
-                        <a:latin typeface="+mn-lt"/>
-                        <a:ea typeface="+mn-ea"/>
-                        <a:cs typeface="+mn-cs"/>
-                      </a:endParaRPr>
-                    </a:p>
-                  </a:txBody>
-                  <a:tcPr marL="0" marR="0" marT="0" marB="0" anchor="ctr"/>
-                </a:tc>
-                <a:tc>
-                  <a:txBody>
-                    <a:bodyPr/>
-                    <a:lstStyle/>
-                    <a:p>
-                      <a:pPr marL="0" algn="ctr" defTabSz="914400" rtl="0" eaLnBrk="1" latinLnBrk="0" hangingPunct="1"/>
-                      <a:r>
-                        <a:rPr lang="en-US" sz="1800" kern="1200" dirty="0">
-                          <a:effectLst/>
-                        </a:rPr>
-                        <a:t>D.R.H</a:t>
-                      </a:r>
-                      <a:endParaRPr lang="pt-BR" sz="1800" kern="1200" dirty="0">
-                        <a:solidFill>
-                          <a:schemeClr val="dk1"/>
-                        </a:solidFill>
-                        <a:effectLst/>
-                        <a:latin typeface="+mn-lt"/>
-                        <a:ea typeface="+mn-ea"/>
-                        <a:cs typeface="+mn-cs"/>
-                      </a:endParaRPr>
-                    </a:p>
-                  </a:txBody>
-                  <a:tcPr/>
-                </a:tc>
-                <a:tc>
-                  <a:txBody>
-                    <a:bodyPr/>
-                    <a:lstStyle/>
-                    <a:p>
-                      <a:pPr marL="0" algn="ctr" defTabSz="914400" rtl="0" eaLnBrk="1" latinLnBrk="0" hangingPunct="1">
-                        <a:spcBef>
-                          <a:spcPts val="200"/>
-                        </a:spcBef>
-                        <a:spcAft>
-                          <a:spcPts val="0"/>
-                        </a:spcAft>
-                      </a:pPr>
-                      <a:r>
-                        <a:rPr lang="en-US" sz="1800" kern="1200" dirty="0" err="1">
-                          <a:effectLst/>
-                        </a:rPr>
-                        <a:t>Capitão</a:t>
-                      </a:r>
-                      <a:r>
-                        <a:rPr lang="en-US" sz="1800" kern="1200" dirty="0">
-                          <a:effectLst/>
-                        </a:rPr>
-                        <a:t> de </a:t>
-                      </a:r>
-                      <a:r>
-                        <a:rPr lang="en-US" sz="1800" kern="1200" dirty="0" err="1">
-                          <a:effectLst/>
-                        </a:rPr>
-                        <a:t>Fragata</a:t>
-                      </a:r>
-                      <a:endParaRPr lang="pt-BR" sz="1800" kern="1200" dirty="0">
-                        <a:solidFill>
-                          <a:schemeClr val="dk1"/>
-                        </a:solidFill>
-                        <a:effectLst/>
-                        <a:latin typeface="+mn-lt"/>
-                        <a:ea typeface="+mn-ea"/>
-                        <a:cs typeface="+mn-cs"/>
-                      </a:endParaRPr>
-                    </a:p>
-                  </a:txBody>
-                  <a:tcPr marL="0" marR="0" marT="0" marB="0" anchor="ctr"/>
-                </a:tc>
-                <a:extLst>
-                  <a:ext uri="{0D108BD9-81ED-4DB2-BD59-A6C34878D82A}">
-                    <a16:rowId xmlns="" xmlns:a16="http://schemas.microsoft.com/office/drawing/2014/main" val="135467775"/>
-                  </a:ext>
-                </a:extLst>
-              </a:tr>
-              <a:tr h="370840">
-                <a:tc>
-                  <a:txBody>
-                    <a:bodyPr/>
-                    <a:lstStyle/>
-                    <a:p>
-                      <a:pPr marL="0" algn="l" defTabSz="914400" rtl="0" eaLnBrk="1" latinLnBrk="0" hangingPunct="1">
-                        <a:spcBef>
-                          <a:spcPts val="425"/>
-                        </a:spcBef>
-                        <a:spcAft>
-                          <a:spcPts val="0"/>
-                        </a:spcAft>
-                      </a:pPr>
-                      <a:r>
-                        <a:rPr lang="en-US" sz="1800" kern="1200" dirty="0">
-                          <a:effectLst/>
-                        </a:rPr>
-                        <a:t>  José </a:t>
-                      </a:r>
-                      <a:r>
-                        <a:rPr lang="en-US" sz="1800" kern="1200" dirty="0" err="1">
-                          <a:effectLst/>
-                        </a:rPr>
-                        <a:t>Cândido</a:t>
-                      </a:r>
-                      <a:r>
-                        <a:rPr lang="en-US" sz="1800" kern="1200" dirty="0">
-                          <a:effectLst/>
-                        </a:rPr>
-                        <a:t> </a:t>
-                      </a:r>
-                      <a:r>
-                        <a:rPr lang="en-US" sz="1800" kern="1200" dirty="0" err="1">
-                          <a:effectLst/>
-                        </a:rPr>
-                        <a:t>Guillobel</a:t>
-                      </a:r>
-                      <a:endParaRPr lang="pt-BR" sz="1800" kern="1200" dirty="0">
-                        <a:solidFill>
-                          <a:schemeClr val="dk1"/>
-                        </a:solidFill>
-                        <a:effectLst/>
-                        <a:latin typeface="+mn-lt"/>
-                        <a:ea typeface="+mn-ea"/>
-                        <a:cs typeface="+mn-cs"/>
-                      </a:endParaRPr>
-                    </a:p>
-                  </a:txBody>
-                  <a:tcPr marL="0" marR="0" marT="0" marB="0" anchor="ctr"/>
-                </a:tc>
-                <a:tc>
-                  <a:txBody>
-                    <a:bodyPr/>
-                    <a:lstStyle/>
-                    <a:p>
-                      <a:pPr marL="0" algn="ctr" defTabSz="914400" rtl="0" eaLnBrk="1" latinLnBrk="0" hangingPunct="1"/>
-                      <a:r>
-                        <a:rPr lang="en-US" sz="1800" kern="1200" dirty="0">
-                          <a:effectLst/>
-                        </a:rPr>
-                        <a:t>D.R.C.M</a:t>
-                      </a:r>
-                      <a:endParaRPr lang="pt-BR" sz="1800" kern="1200" dirty="0">
-                        <a:solidFill>
-                          <a:schemeClr val="dk1"/>
-                        </a:solidFill>
-                        <a:effectLst/>
-                        <a:latin typeface="+mn-lt"/>
-                        <a:ea typeface="+mn-ea"/>
-                        <a:cs typeface="+mn-cs"/>
-                      </a:endParaRPr>
-                    </a:p>
-                  </a:txBody>
-                  <a:tcPr/>
-                </a:tc>
-                <a:tc>
-                  <a:txBody>
-                    <a:bodyPr/>
-                    <a:lstStyle/>
-                    <a:p>
-                      <a:pPr marL="0" algn="ctr" defTabSz="914400" rtl="0" eaLnBrk="1" latinLnBrk="0" hangingPunct="1"/>
-                      <a:r>
-                        <a:rPr lang="en-US" sz="1800" kern="1200" dirty="0">
-                          <a:effectLst/>
-                        </a:rPr>
-                        <a:t>Contra - Almirante</a:t>
-                      </a:r>
-                      <a:endParaRPr lang="pt-BR" sz="1800" kern="1200" dirty="0">
-                        <a:solidFill>
-                          <a:schemeClr val="dk1"/>
-                        </a:solidFill>
-                        <a:effectLst/>
-                        <a:latin typeface="+mn-lt"/>
-                        <a:ea typeface="+mn-ea"/>
-                        <a:cs typeface="+mn-cs"/>
-                      </a:endParaRPr>
-                    </a:p>
-                  </a:txBody>
-                  <a:tcPr/>
-                </a:tc>
-                <a:extLst>
-                  <a:ext uri="{0D108BD9-81ED-4DB2-BD59-A6C34878D82A}">
-                    <a16:rowId xmlns="" xmlns:a16="http://schemas.microsoft.com/office/drawing/2014/main" val="4145379582"/>
-                  </a:ext>
-                </a:extLst>
-              </a:tr>
-              <a:tr h="370840">
-                <a:tc>
-                  <a:txBody>
-                    <a:bodyPr/>
-                    <a:lstStyle/>
-                    <a:p>
-                      <a:pPr marL="0" algn="l" defTabSz="914400" rtl="0" eaLnBrk="1" latinLnBrk="0" hangingPunct="1"/>
-                      <a:r>
-                        <a:rPr lang="en-US" sz="1800" kern="1200" dirty="0">
-                          <a:effectLst/>
-                        </a:rPr>
-                        <a:t>Arthur </a:t>
-                      </a:r>
-                      <a:r>
-                        <a:rPr lang="en-US" sz="1800" kern="1200" dirty="0" err="1">
-                          <a:effectLst/>
-                        </a:rPr>
-                        <a:t>Jaceguay</a:t>
-                      </a:r>
-                      <a:endParaRPr lang="pt-BR" sz="1800" kern="1200" dirty="0">
-                        <a:solidFill>
-                          <a:schemeClr val="dk1"/>
-                        </a:solidFill>
-                        <a:effectLst/>
-                        <a:latin typeface="+mn-lt"/>
-                        <a:ea typeface="+mn-ea"/>
-                        <a:cs typeface="+mn-cs"/>
-                      </a:endParaRPr>
-                    </a:p>
-                  </a:txBody>
-                  <a:tcPr/>
-                </a:tc>
-                <a:tc>
-                  <a:txBody>
-                    <a:bodyPr/>
-                    <a:lstStyle/>
-                    <a:p>
-                      <a:pPr marL="0" algn="ctr" defTabSz="914400" rtl="0" eaLnBrk="1" latinLnBrk="0" hangingPunct="1"/>
-                      <a:r>
-                        <a:rPr lang="pt-BR" sz="1800" kern="1200" dirty="0">
-                          <a:effectLst/>
-                        </a:rPr>
-                        <a:t>S.N</a:t>
-                      </a:r>
-                      <a:endParaRPr lang="pt-BR" sz="1800" kern="1200" dirty="0">
-                        <a:solidFill>
-                          <a:schemeClr val="dk1"/>
-                        </a:solidFill>
-                        <a:effectLst/>
-                        <a:latin typeface="+mn-lt"/>
-                        <a:ea typeface="+mn-ea"/>
-                        <a:cs typeface="+mn-cs"/>
-                      </a:endParaRPr>
-                    </a:p>
-                  </a:txBody>
-                  <a:tcPr/>
-                </a:tc>
-                <a:tc>
-                  <a:txBody>
-                    <a:bodyPr/>
-                    <a:lstStyle/>
-                    <a:p>
-                      <a:pPr marL="0" algn="ctr" defTabSz="914400" rtl="0" eaLnBrk="1" latinLnBrk="0" hangingPunct="1"/>
-                      <a:r>
-                        <a:rPr lang="pt-BR" sz="1800" kern="1200" dirty="0">
-                          <a:effectLst/>
-                        </a:rPr>
-                        <a:t>Almirante</a:t>
-                      </a:r>
-                      <a:endParaRPr lang="pt-BR" sz="1800" kern="1200" dirty="0">
-                        <a:solidFill>
-                          <a:schemeClr val="dk1"/>
-                        </a:solidFill>
-                        <a:effectLst/>
-                        <a:latin typeface="+mn-lt"/>
-                        <a:ea typeface="+mn-ea"/>
-                        <a:cs typeface="+mn-cs"/>
-                      </a:endParaRPr>
-                    </a:p>
-                  </a:txBody>
-                  <a:tcPr/>
-                </a:tc>
-                <a:extLst>
-                  <a:ext uri="{0D108BD9-81ED-4DB2-BD59-A6C34878D82A}">
-                    <a16:rowId xmlns="" xmlns:a16="http://schemas.microsoft.com/office/drawing/2014/main" val="2446563659"/>
-                  </a:ext>
-                </a:extLst>
-              </a:tr>
-              <a:tr h="370840">
-                <a:tc>
-                  <a:txBody>
-                    <a:bodyPr/>
-                    <a:lstStyle/>
-                    <a:p>
-                      <a:pPr marL="0" algn="l" defTabSz="914400" rtl="0" eaLnBrk="1" latinLnBrk="0" hangingPunct="1"/>
-                      <a:r>
-                        <a:rPr lang="en-US" sz="1800" kern="1200" dirty="0">
-                          <a:effectLst/>
-                        </a:rPr>
-                        <a:t>Orlando Augusto Amaral </a:t>
-                      </a:r>
-                      <a:r>
-                        <a:rPr lang="en-US" sz="1800" kern="1200" dirty="0" err="1">
-                          <a:effectLst/>
-                        </a:rPr>
-                        <a:t>Affonso</a:t>
-                      </a:r>
-                      <a:endParaRPr lang="pt-BR" sz="1800" kern="1200" dirty="0">
-                        <a:solidFill>
-                          <a:schemeClr val="dk1"/>
-                        </a:solidFill>
-                        <a:effectLst/>
-                        <a:latin typeface="+mn-lt"/>
-                        <a:ea typeface="+mn-ea"/>
-                        <a:cs typeface="+mn-cs"/>
-                      </a:endParaRPr>
-                    </a:p>
-                  </a:txBody>
-                  <a:tcPr/>
-                </a:tc>
-                <a:tc>
-                  <a:txBody>
-                    <a:bodyPr/>
-                    <a:lstStyle/>
-                    <a:p>
-                      <a:pPr marL="0" algn="ctr" defTabSz="914400" rtl="0" eaLnBrk="1" latinLnBrk="0" hangingPunct="1"/>
-                      <a:r>
-                        <a:rPr lang="pt-BR" sz="1800" kern="1200" dirty="0">
-                          <a:effectLst/>
-                        </a:rPr>
-                        <a:t>D.N.H</a:t>
-                      </a:r>
-                      <a:endParaRPr lang="pt-BR" sz="1800" kern="1200" dirty="0">
-                        <a:solidFill>
-                          <a:schemeClr val="dk1"/>
-                        </a:solidFill>
-                        <a:effectLst/>
-                        <a:latin typeface="+mn-lt"/>
-                        <a:ea typeface="+mn-ea"/>
-                        <a:cs typeface="+mn-cs"/>
-                      </a:endParaRPr>
-                    </a:p>
-                  </a:txBody>
-                  <a:tcPr/>
-                </a:tc>
-                <a:tc>
-                  <a:txBody>
-                    <a:bodyPr/>
-                    <a:lstStyle/>
-                    <a:p>
-                      <a:pPr marL="0" algn="ctr" defTabSz="914400" rtl="0" eaLnBrk="1" latinLnBrk="0" hangingPunct="1"/>
-                      <a:r>
-                        <a:rPr lang="pt-BR" sz="1800" kern="1200" dirty="0">
-                          <a:effectLst/>
-                        </a:rPr>
-                        <a:t>Capitão-de-Mar-e-Guerra</a:t>
-                      </a:r>
-                      <a:endParaRPr lang="pt-BR" sz="1800" kern="1200" dirty="0">
-                        <a:solidFill>
-                          <a:schemeClr val="dk1"/>
-                        </a:solidFill>
-                        <a:effectLst/>
-                        <a:latin typeface="+mn-lt"/>
-                        <a:ea typeface="+mn-ea"/>
-                        <a:cs typeface="+mn-cs"/>
-                      </a:endParaRPr>
-                    </a:p>
-                  </a:txBody>
-                  <a:tcPr/>
-                </a:tc>
-                <a:extLst>
-                  <a:ext uri="{0D108BD9-81ED-4DB2-BD59-A6C34878D82A}">
-                    <a16:rowId xmlns="" xmlns:a16="http://schemas.microsoft.com/office/drawing/2014/main" val="2833977859"/>
-                  </a:ext>
-                </a:extLst>
-              </a:tr>
-            </a:tbl>
-          </a:graphicData>
-        </a:graphic>
-      </p:graphicFrame>
-    </p:spTree>
-    <p:extLst>
-      <p:ext uri="{BB962C8B-B14F-4D97-AF65-F5344CB8AC3E}">
-        <p14:creationId xmlns:p14="http://schemas.microsoft.com/office/powerpoint/2010/main" val="4220470114"/>
-      </p:ext>
-    </p:extLst>
-  </p:cSld>
-  <p:clrMapOvr>
-    <a:masterClrMapping/>
-  </p:clrMapOvr>
-  <p:timing>
-    <p:tnLst>
-      <p:par>
-        <p:cTn id="1" dur="indefinite" restart="never" nodeType="tmRoot"/>
-      </p:par>
-    </p:tnLst>
-  </p:timing>
 </p:sld>
 </file>
 
@@ -6982,159 +6071,112 @@
             <p:ph type="title"/>
           </p:nvPr>
         </p:nvSpPr>
-        <p:spPr/>
-        <p:txBody>
-          <a:bodyPr/>
-          <a:lstStyle/>
-          <a:p>
-            <a:r>
-              <a:rPr lang="pt-BR" b="1" dirty="0" smtClean="0"/>
-              <a:t>CRONONOGRAMA DO TAP</a:t>
-            </a:r>
-            <a:endParaRPr lang="pt-BR" b="1" dirty="0"/>
-          </a:p>
-        </p:txBody>
-      </p:sp>
-      <p:sp>
-        <p:nvSpPr>
-          <p:cNvPr id="3" name="Espaço Reservado para Conteúdo 2"/>
-          <p:cNvSpPr>
-            <a:spLocks noGrp="1"/>
-          </p:cNvSpPr>
-          <p:nvPr>
-            <p:ph idx="1"/>
-          </p:nvPr>
-        </p:nvSpPr>
-        <p:spPr>
-          <a:xfrm>
-            <a:off x="913794" y="1579418"/>
-            <a:ext cx="10516205" cy="4918364"/>
+        <p:spPr>
+          <a:xfrm>
+            <a:off x="913795" y="609600"/>
+            <a:ext cx="10353761" cy="886691"/>
           </a:xfrm>
         </p:spPr>
         <p:txBody>
           <a:bodyPr>
-            <a:normAutofit fontScale="85000" lnSpcReduction="10000"/>
+            <a:normAutofit/>
           </a:bodyPr>
           <a:lstStyle/>
           <a:p>
             <a:r>
-              <a:rPr lang="en-US" b="1" dirty="0">
+              <a:rPr lang="en-US" sz="2800" dirty="0">
                 <a:effectLst/>
               </a:rPr>
               <a:t>1. OBJETIVO DO PROJETO</a:t>
             </a:r>
           </a:p>
-          <a:p>
-            <a:r>
-              <a:rPr lang="pt-BR" b="1" dirty="0">
+        </p:txBody>
+      </p:sp>
+      <p:sp>
+        <p:nvSpPr>
+          <p:cNvPr id="3" name="Espaço Reservado para Conteúdo 2"/>
+          <p:cNvSpPr>
+            <a:spLocks noGrp="1"/>
+          </p:cNvSpPr>
+          <p:nvPr>
+            <p:ph idx="1"/>
+          </p:nvPr>
+        </p:nvSpPr>
+        <p:spPr>
+          <a:xfrm>
+            <a:off x="387927" y="2701636"/>
+            <a:ext cx="6082145" cy="1939637"/>
+          </a:xfrm>
+        </p:spPr>
+        <p:txBody>
+          <a:bodyPr>
+            <a:normAutofit/>
+          </a:bodyPr>
+          <a:lstStyle/>
+          <a:p>
+            <a:pPr algn="just"/>
+            <a:r>
+              <a:rPr lang="pt-BR" dirty="0">
                 <a:effectLst/>
               </a:rPr>
-              <a:t>2. JUSTIFICATIVAS</a:t>
-            </a:r>
-          </a:p>
-          <a:p>
-            <a:r>
-              <a:rPr lang="pt-BR" b="1" dirty="0">
+              <a:t> SISTEMA DE DEFESA ANTÍ MÍSSIL capaz de vencer ataques de SATURAÇÃO.</a:t>
+            </a:r>
+          </a:p>
+          <a:p>
+            <a:pPr algn="just"/>
+            <a:r>
+              <a:rPr lang="pt-BR" dirty="0">
                 <a:effectLst/>
               </a:rPr>
-              <a:t>3. GERENTE DO PROJETO, RESPONSABILIBIDADES E AUTORIDADE</a:t>
-            </a:r>
-          </a:p>
-          <a:p>
-            <a:r>
-              <a:rPr lang="en-US" b="1" dirty="0">
-                <a:effectLst/>
-              </a:rPr>
-              <a:t>4. METAS</a:t>
-            </a:r>
-          </a:p>
-          <a:p>
-            <a:r>
-              <a:rPr lang="en-US" b="1" dirty="0">
-                <a:effectLst/>
-              </a:rPr>
-              <a:t>5. PREMISSAS</a:t>
-            </a:r>
-          </a:p>
-          <a:p>
-            <a:r>
-              <a:rPr lang="en-US" b="1" dirty="0">
-                <a:effectLst/>
-              </a:rPr>
-              <a:t>6. RESTRIÇÕES</a:t>
-            </a:r>
-          </a:p>
-          <a:p>
-            <a:r>
-              <a:rPr lang="pt-BR" b="1" dirty="0">
-                <a:effectLst/>
-              </a:rPr>
-              <a:t>7. METODOLOGIA</a:t>
-            </a:r>
-            <a:endParaRPr lang="pt-BR" dirty="0">
-              <a:effectLst/>
-            </a:endParaRPr>
-          </a:p>
-          <a:p>
-            <a:r>
-              <a:rPr lang="en-US" b="1" dirty="0">
-                <a:effectLst/>
-              </a:rPr>
-              <a:t>8. RISCOS</a:t>
-            </a:r>
-          </a:p>
-          <a:p>
-            <a:r>
-              <a:rPr lang="en-US" b="1" dirty="0">
-                <a:effectLst/>
-              </a:rPr>
-              <a:t>9. PRAZO E INVESTIMENTO</a:t>
-            </a:r>
-          </a:p>
-          <a:p>
-            <a:r>
-              <a:rPr lang="en-US" b="1" dirty="0">
-                <a:effectLst/>
-              </a:rPr>
-              <a:t>10. PLANO DE AQUISIÇÕES</a:t>
-            </a:r>
-          </a:p>
-          <a:p>
-            <a:r>
-              <a:rPr lang="en-US" b="1" dirty="0">
-                <a:effectLst/>
-              </a:rPr>
-              <a:t>11. PRINCIPAIS ETAPAS</a:t>
-            </a:r>
-          </a:p>
-          <a:p>
-            <a:r>
-              <a:rPr lang="en-US" b="1" dirty="0">
-                <a:effectLst/>
-              </a:rPr>
-              <a:t>12. RELAÇÃO DAS PARTES INTERESSADAS</a:t>
-            </a:r>
+              <a:t>Identificando alvos e conduzir os misseis MM-38 EXOCET na defesa da embarcação.</a:t>
+            </a:r>
+          </a:p>
+          <a:p>
+            <a:pPr algn="just"/>
             <a:endParaRPr lang="pt-BR" dirty="0"/>
           </a:p>
         </p:txBody>
       </p:sp>
+      <p:pic>
+        <p:nvPicPr>
+          <p:cNvPr id="6" name="Imagem 5"/>
+          <p:cNvPicPr>
+            <a:picLocks noChangeAspect="1"/>
+          </p:cNvPicPr>
+          <p:nvPr/>
+        </p:nvPicPr>
+        <p:blipFill>
+          <a:blip r:embed="rId2">
+            <a:extLst>
+              <a:ext uri="{28A0092B-C50C-407E-A947-70E740481C1C}">
+                <a14:useLocalDpi xmlns:a14="http://schemas.microsoft.com/office/drawing/2010/main" val="0"/>
+              </a:ext>
+            </a:extLst>
+          </a:blip>
+          <a:stretch>
+            <a:fillRect/>
+          </a:stretch>
+        </p:blipFill>
+        <p:spPr>
+          <a:xfrm>
+            <a:off x="6470072" y="1690688"/>
+            <a:ext cx="5101807" cy="4351338"/>
+          </a:xfrm>
+          <a:prstGeom prst="rect">
+            <a:avLst/>
+          </a:prstGeom>
+        </p:spPr>
+      </p:pic>
     </p:spTree>
     <p:extLst>
       <p:ext uri="{BB962C8B-B14F-4D97-AF65-F5344CB8AC3E}">
-        <p14:creationId xmlns:p14="http://schemas.microsoft.com/office/powerpoint/2010/main" val="498449334"/>
+        <p14:creationId xmlns:p14="http://schemas.microsoft.com/office/powerpoint/2010/main" val="3084028923"/>
       </p:ext>
     </p:extLst>
   </p:cSld>
   <p:clrMapOvr>
     <a:masterClrMapping/>
   </p:clrMapOvr>
-  <p:timing>
-    <p:tnLst>
-      <p:par>
-        <p:cTn id="1" dur="indefinite" restart="never" nodeType="tmRoot"/>
-      </p:par>
-    </p:tnLst>
-  </p:timing>
 </p:sld>
 </file>
 
@@ -7167,84 +6209,106 @@
         </p:nvSpPr>
         <p:spPr>
           <a:xfrm>
-            <a:off x="913795" y="609600"/>
-            <a:ext cx="10353761" cy="886691"/>
-          </a:xfrm>
-        </p:spPr>
-        <p:txBody>
-          <a:bodyPr/>
-          <a:lstStyle/>
-          <a:p>
-            <a:r>
-              <a:rPr lang="en-US" dirty="0">
+            <a:off x="913795" y="1246908"/>
+            <a:ext cx="10353761" cy="845127"/>
+          </a:xfrm>
+        </p:spPr>
+        <p:txBody>
+          <a:bodyPr>
+            <a:normAutofit fontScale="90000"/>
+          </a:bodyPr>
+          <a:lstStyle/>
+          <a:p>
+            <a:r>
+              <a:rPr lang="pt-BR" sz="3100" dirty="0">
                 <a:effectLst/>
               </a:rPr>
-              <a:t>1. OBJETIVO DO PROJETO</a:t>
-            </a:r>
-          </a:p>
-        </p:txBody>
-      </p:sp>
-      <p:sp>
-        <p:nvSpPr>
-          <p:cNvPr id="3" name="Espaço Reservado para Conteúdo 2"/>
-          <p:cNvSpPr>
-            <a:spLocks noGrp="1"/>
-          </p:cNvSpPr>
-          <p:nvPr>
-            <p:ph idx="1"/>
-          </p:nvPr>
-        </p:nvSpPr>
-        <p:spPr>
-          <a:xfrm>
-            <a:off x="838200" y="1690687"/>
-            <a:ext cx="5354782" cy="4848657"/>
-          </a:xfrm>
-        </p:spPr>
-        <p:txBody>
-          <a:bodyPr>
-            <a:normAutofit fontScale="85000" lnSpcReduction="20000"/>
-          </a:bodyPr>
-          <a:lstStyle/>
-          <a:p>
-            <a:pPr algn="just"/>
-            <a:r>
+              <a:t>2. SITUAÇÃO ATUAL E JUSTIFICATIVA DO PROJETO</a:t>
+            </a:r>
+            <a:br>
               <a:rPr lang="pt-BR" dirty="0">
                 <a:effectLst/>
               </a:rPr>
-              <a:t>A Fragata Liberal (F-43) é uma fragata da Classe Niterói, da Marinha do Brasil. Fruto do "Programa de Renovação e Ampliação de Meios Flutuantes" da Marinha, concebido na década de 1970.</a:t>
-            </a:r>
-          </a:p>
+            </a:br>
+            <a:endParaRPr lang="pt-BR" dirty="0">
+              <a:effectLst/>
+            </a:endParaRPr>
+          </a:p>
+        </p:txBody>
+      </p:sp>
+      <p:sp>
+        <p:nvSpPr>
+          <p:cNvPr id="3" name="Espaço Reservado para Conteúdo 2"/>
+          <p:cNvSpPr>
+            <a:spLocks noGrp="1"/>
+          </p:cNvSpPr>
+          <p:nvPr>
+            <p:ph idx="1"/>
+          </p:nvPr>
+        </p:nvSpPr>
+        <p:spPr>
+          <a:xfrm>
+            <a:off x="838199" y="2092036"/>
+            <a:ext cx="10841183" cy="4447308"/>
+          </a:xfrm>
+        </p:spPr>
+        <p:txBody>
+          <a:bodyPr>
+            <a:normAutofit/>
+          </a:bodyPr>
+          <a:lstStyle/>
           <a:p>
             <a:pPr algn="just"/>
             <a:r>
               <a:rPr lang="pt-BR" dirty="0">
                 <a:effectLst/>
               </a:rPr>
-              <a:t>Construída nos estaleiros </a:t>
-            </a:r>
-            <a:r>
-              <a:rPr lang="pt-BR" dirty="0" err="1">
+              <a:t>Os sensores contidos na Fragata Liberal F – 43 -  </a:t>
+            </a:r>
+            <a:r>
+              <a:rPr lang="pt-BR" b="1" dirty="0">
                 <a:effectLst/>
               </a:rPr>
-              <a:t>Vosper-Tornicroft</a:t>
-            </a:r>
+              <a:t>2 radares de direção de tiro </a:t>
+            </a:r>
+            <a:r>
+              <a:rPr lang="pt-BR" b="1" dirty="0" err="1">
+                <a:effectLst/>
+              </a:rPr>
+              <a:t>Selex</a:t>
+            </a:r>
+            <a:r>
+              <a:rPr lang="pt-BR" b="1" dirty="0">
+                <a:effectLst/>
+              </a:rPr>
+              <a:t> Orion RTN-30X.</a:t>
+            </a:r>
+          </a:p>
+          <a:p>
+            <a:pPr algn="just"/>
             <a:r>
               <a:rPr lang="pt-BR" dirty="0">
                 <a:effectLst/>
               </a:rPr>
-              <a:t> </a:t>
-            </a:r>
-            <a:r>
-              <a:rPr lang="pt-BR" dirty="0" err="1">
+              <a:t> Os radares do tipo </a:t>
+            </a:r>
+            <a:r>
+              <a:rPr lang="pt-BR" b="1" dirty="0" err="1">
                 <a:effectLst/>
               </a:rPr>
-              <a:t>Ltd</a:t>
+              <a:t>Selex</a:t>
+            </a:r>
+            <a:r>
+              <a:rPr lang="pt-BR" b="1" dirty="0">
+                <a:effectLst/>
+              </a:rPr>
+              <a:t> Orion RTN-30X</a:t>
             </a:r>
             <a:r>
               <a:rPr lang="pt-BR" dirty="0">
                 <a:effectLst/>
               </a:rPr>
-              <a:t>., na Inglaterra, em 1975, o seu batimento de quilha ocorreu a 2 de maio. </a:t>
+              <a:t> estão desatualizados em relação aos novos sistemas de antimísseis navais das diversas Forças Marítimas internacionais.</a:t>
             </a:r>
           </a:p>
           <a:p>
@@ -7253,86 +6317,35 @@
               <a:rPr lang="pt-BR" dirty="0">
                 <a:effectLst/>
               </a:rPr>
-              <a:t> Atualmente está em missão pela ONU, desde setembro de 2016, na Força Interina das Nações Unidas no Líbano, </a:t>
-            </a:r>
-            <a:r>
-              <a:rPr lang="pt-BR" b="1" dirty="0">
-                <a:solidFill>
-                  <a:srgbClr val="FFFF00"/>
-                </a:solidFill>
-                <a:effectLst/>
-              </a:rPr>
-              <a:t>devido a crescente tensão internacional, juntando a isso ameaças terroristas, tornou-se necessário o investimento em um SISTEMA DE DEFESA ANTÍ MÍSSIL, implantado utilizando um RADAR ULTRASÔNICO</a:t>
-            </a:r>
-            <a:r>
-              <a:rPr lang="pt-BR" dirty="0">
-                <a:solidFill>
-                  <a:srgbClr val="FFFF00"/>
-                </a:solidFill>
-                <a:effectLst/>
-              </a:rPr>
-              <a:t>,</a:t>
-            </a:r>
+              <a:t>Ameaças e tensão internacional.</a:t>
+            </a:r>
+          </a:p>
+          <a:p>
+            <a:pPr algn="just"/>
             <a:r>
               <a:rPr lang="pt-BR" dirty="0">
                 <a:effectLst/>
               </a:rPr>
-              <a:t> para proteger a integridade da embarcação e de sua tripulação.</a:t>
-            </a:r>
-          </a:p>
-          <a:p>
-            <a:pPr algn="just"/>
-            <a:endParaRPr lang="pt-BR" dirty="0"/>
-          </a:p>
-        </p:txBody>
-      </p:sp>
-      <p:pic>
-        <p:nvPicPr>
-          <p:cNvPr id="6" name="Imagem 5"/>
-          <p:cNvPicPr>
-            <a:picLocks noChangeAspect="1"/>
-          </p:cNvPicPr>
-          <p:nvPr/>
-        </p:nvPicPr>
-        <p:blipFill>
-          <a:blip r:embed="rId2">
-            <a:extLst>
-              <a:ext uri="{28A0092B-C50C-407E-A947-70E740481C1C}">
-                <a14:useLocalDpi xmlns:a14="http://schemas.microsoft.com/office/drawing/2010/main" val="0"/>
-              </a:ext>
-            </a:extLst>
-          </a:blip>
-          <a:stretch>
-            <a:fillRect/>
-          </a:stretch>
-        </p:blipFill>
-        <p:spPr>
-          <a:xfrm>
-            <a:off x="6470072" y="1690688"/>
-            <a:ext cx="5101807" cy="4351338"/>
-          </a:xfrm>
-          <a:prstGeom prst="rect">
-            <a:avLst/>
-          </a:prstGeom>
-        </p:spPr>
-      </p:pic>
+              <a:t>Atualização para um moderno sistema de antimísseis com RADARES ULTRASSÔNICOS de produção da Corporação Militar SURICORP. SA.</a:t>
+            </a:r>
+          </a:p>
+          <a:p>
+            <a:endParaRPr lang="pt-BR" dirty="0">
+              <a:effectLst/>
+            </a:endParaRPr>
+          </a:p>
+        </p:txBody>
+      </p:sp>
     </p:spTree>
     <p:extLst>
       <p:ext uri="{BB962C8B-B14F-4D97-AF65-F5344CB8AC3E}">
-        <p14:creationId xmlns:p14="http://schemas.microsoft.com/office/powerpoint/2010/main" val="3084028923"/>
+        <p14:creationId xmlns:p14="http://schemas.microsoft.com/office/powerpoint/2010/main" val="2234355776"/>
       </p:ext>
     </p:extLst>
   </p:cSld>
   <p:clrMapOvr>
     <a:masterClrMapping/>
   </p:clrMapOvr>
-  <p:timing>
-    <p:tnLst>
-      <p:par>
-        <p:cTn id="1" dur="indefinite" restart="never" nodeType="tmRoot"/>
-      </p:par>
-    </p:tnLst>
-  </p:timing>
 </p:sld>
 </file>
 
@@ -7370,131 +6383,71 @@
           </a:xfrm>
         </p:spPr>
         <p:txBody>
-          <a:bodyPr/>
-          <a:lstStyle/>
-          <a:p>
+          <a:bodyPr>
+            <a:normAutofit/>
+          </a:bodyPr>
+          <a:lstStyle/>
+          <a:p>
+            <a:r>
+              <a:rPr lang="pt-BR" sz="2800" dirty="0">
+                <a:effectLst/>
+              </a:rPr>
+              <a:t>3. OBJETIVOS E CRITÉRIOS DE SUCESSO DO PROJETO</a:t>
+            </a:r>
+          </a:p>
+        </p:txBody>
+      </p:sp>
+      <p:sp>
+        <p:nvSpPr>
+          <p:cNvPr id="3" name="Espaço Reservado para Conteúdo 2"/>
+          <p:cNvSpPr>
+            <a:spLocks noGrp="1"/>
+          </p:cNvSpPr>
+          <p:nvPr>
+            <p:ph idx="1"/>
+          </p:nvPr>
+        </p:nvSpPr>
+        <p:spPr>
+          <a:xfrm>
+            <a:off x="838199" y="2563090"/>
+            <a:ext cx="10429357" cy="3976253"/>
+          </a:xfrm>
+        </p:spPr>
+        <p:txBody>
+          <a:bodyPr>
+            <a:normAutofit/>
+          </a:bodyPr>
+          <a:lstStyle/>
+          <a:p>
+            <a:pPr algn="just"/>
             <a:r>
               <a:rPr lang="pt-BR" dirty="0">
                 <a:effectLst/>
               </a:rPr>
-              <a:t>2. JUSTIFICATIVAS</a:t>
-            </a:r>
-          </a:p>
-        </p:txBody>
-      </p:sp>
-      <p:sp>
-        <p:nvSpPr>
-          <p:cNvPr id="3" name="Espaço Reservado para Conteúdo 2"/>
-          <p:cNvSpPr>
-            <a:spLocks noGrp="1"/>
-          </p:cNvSpPr>
-          <p:nvPr>
-            <p:ph idx="1"/>
-          </p:nvPr>
-        </p:nvSpPr>
-        <p:spPr>
-          <a:xfrm>
-            <a:off x="838199" y="1690687"/>
-            <a:ext cx="6560127" cy="4848657"/>
-          </a:xfrm>
-        </p:spPr>
-        <p:txBody>
-          <a:bodyPr>
-            <a:normAutofit fontScale="70000" lnSpcReduction="20000"/>
-          </a:bodyPr>
-          <a:lstStyle/>
-          <a:p>
-            <a:pPr algn="just"/>
+              <a:t>O SISTEMA DE DEFESA ANTIMISSEL COM RADAR ULTRASSÔNICO será considerado finalizado se:</a:t>
+            </a:r>
+          </a:p>
+          <a:p>
+            <a:pPr marL="803275" algn="just"/>
             <a:r>
               <a:rPr lang="pt-BR" dirty="0">
                 <a:effectLst/>
               </a:rPr>
-              <a:t>O projeto está sendo conduzido a fim de prevenir que no </a:t>
-            </a:r>
-            <a:r>
-              <a:rPr lang="pt-BR" sz="2300" dirty="0">
-                <a:effectLst/>
-              </a:rPr>
-              <a:t>caso de ocorrer um ataque a F Liberal / F- 43 da Marinha do Brasil o sistema de guerra antiaérea (AAW) naval seja capaz de conter ataques de saturação. </a:t>
-            </a:r>
-          </a:p>
-          <a:p>
-            <a:pPr algn="just"/>
-            <a:r>
-              <a:rPr lang="pt-BR" sz="2300" dirty="0">
-                <a:effectLst/>
-              </a:rPr>
-              <a:t>Quanto maior a razão de varredura do radar, maior a quantidade de informação do alvo. A razão de dados é proporcional a rotação da antena.</a:t>
-            </a:r>
-          </a:p>
-          <a:p>
-            <a:pPr algn="just"/>
-            <a:r>
-              <a:rPr lang="pt-BR" sz="2300" dirty="0">
-                <a:effectLst/>
-              </a:rPr>
-              <a:t>O sensor ultrassônico é composto de um emissor e um receptor de ondas sonoras. O sinal emitido, ao colidir com qualquer obstáculo, é refletido de volta na direção do sensor. Durante todo o processo, o aparelho está com uma espécie de “cronômetro” de alta precisão funcionando. </a:t>
-            </a:r>
-          </a:p>
-          <a:p>
-            <a:pPr algn="just"/>
-            <a:r>
-              <a:rPr lang="pt-BR" sz="2300" dirty="0">
-                <a:effectLst/>
-              </a:rPr>
-              <a:t>Assim, podemos saber quanto tempo o sinal levou desde a sua emissão até o seu retorno. Como a velocidade do som no ar é conhecida, é possível, de posse do tempo que o sinal levou para ir até o obstáculo e voltar, calcular a distância entre o sensor e o obstáculo. </a:t>
-            </a:r>
-            <a:endParaRPr lang="pt-BR" sz="2300" dirty="0"/>
-          </a:p>
-        </p:txBody>
-      </p:sp>
-      <p:pic>
-        <p:nvPicPr>
-          <p:cNvPr id="6" name="Imagem 5"/>
-          <p:cNvPicPr>
-            <a:picLocks noChangeAspect="1"/>
-          </p:cNvPicPr>
-          <p:nvPr/>
-        </p:nvPicPr>
-        <p:blipFill>
-          <a:blip r:embed="rId2">
-            <a:extLst>
-              <a:ext uri="{28A0092B-C50C-407E-A947-70E740481C1C}">
-                <a14:useLocalDpi xmlns:a14="http://schemas.microsoft.com/office/drawing/2010/main" val="0"/>
-              </a:ext>
-            </a:extLst>
-          </a:blip>
-          <a:stretch>
-            <a:fillRect/>
-          </a:stretch>
-        </p:blipFill>
-        <p:spPr>
-          <a:xfrm>
-            <a:off x="7564582" y="1690687"/>
-            <a:ext cx="4228970" cy="4848657"/>
-          </a:xfrm>
-          <a:prstGeom prst="rect">
-            <a:avLst/>
-          </a:prstGeom>
-        </p:spPr>
-      </p:pic>
+              <a:t>Na data final da entrega não houver nenhum incidente em aberto ou pendente por parte da SURICORP e da DIRETORIA DA MARINHA DO BRASIL.</a:t>
+            </a:r>
+          </a:p>
+        </p:txBody>
+      </p:sp>
     </p:spTree>
     <p:extLst>
       <p:ext uri="{BB962C8B-B14F-4D97-AF65-F5344CB8AC3E}">
-        <p14:creationId xmlns:p14="http://schemas.microsoft.com/office/powerpoint/2010/main" val="2234355776"/>
+        <p14:creationId xmlns:p14="http://schemas.microsoft.com/office/powerpoint/2010/main" val="897766039"/>
       </p:ext>
     </p:extLst>
   </p:cSld>
   <p:clrMapOvr>
     <a:masterClrMapping/>
   </p:clrMapOvr>
-  <p:timing>
-    <p:tnLst>
-      <p:par>
-        <p:cTn id="1" dur="indefinite" restart="never" nodeType="tmRoot"/>
-      </p:par>
-    </p:tnLst>
-  </p:timing>
 </p:sld>
 </file>
 
@@ -7538,11 +6491,25 @@
           <a:lstStyle/>
           <a:p>
             <a:r>
+              <a:rPr lang="pt-BR" sz="2800" dirty="0">
+                <a:effectLst/>
+              </a:rPr>
+              <a:t>4. </a:t>
+            </a:r>
+            <a:r>
               <a:rPr lang="pt-BR" dirty="0">
                 <a:effectLst/>
               </a:rPr>
-              <a:t>3. GERENTE DO PROJETO, RESPONSABILIBIDADES E AUTORIDADE</a:t>
-            </a:r>
+              <a:t>REQUISITOS FUNCIONAIS</a:t>
+            </a:r>
+            <a:br>
+              <a:rPr lang="pt-BR" dirty="0">
+                <a:effectLst/>
+              </a:rPr>
+            </a:br>
+            <a:endParaRPr lang="pt-BR" sz="2800" dirty="0">
+              <a:effectLst/>
+            </a:endParaRPr>
           </a:p>
         </p:txBody>
       </p:sp>
@@ -7558,8 +6525,8 @@
         </p:nvSpPr>
         <p:spPr>
           <a:xfrm>
-            <a:off x="838199" y="2244436"/>
-            <a:ext cx="10429357" cy="4294908"/>
+            <a:off x="838199" y="1745674"/>
+            <a:ext cx="10429357" cy="4793670"/>
           </a:xfrm>
         </p:spPr>
         <p:txBody>
@@ -7568,21 +6535,69 @@
           </a:bodyPr>
           <a:lstStyle/>
           <a:p>
-            <a:pPr algn="just"/>
-            <a:r>
-              <a:rPr lang="pt-BR" b="1" dirty="0">
-                <a:solidFill>
-                  <a:srgbClr val="FFC000"/>
-                </a:solidFill>
+            <a:pPr lvl="0"/>
+            <a:r>
+              <a:rPr lang="pt-BR" sz="2400" dirty="0">
                 <a:effectLst/>
               </a:rPr>
-              <a:t>ADRIANO CARVALHO / THIARLLESON SANTOS / CRISTIANO ROBERTO / LUIZ CARLOS / MARLLON MORAES / VICTOR CORRÊA </a:t>
-            </a:r>
-            <a:r>
-              <a:rPr lang="pt-BR" dirty="0">
+              <a:t>RF001 -Calcular distância do objeto ao radar.</a:t>
+            </a:r>
+          </a:p>
+          <a:p>
+            <a:pPr lvl="0"/>
+            <a:r>
+              <a:rPr lang="pt-BR" sz="2400" dirty="0">
                 <a:effectLst/>
               </a:rPr>
-              <a:t>tem autoridade para selecionar o seu pessoal e determinar o orçamento para este projeto.</a:t>
+              <a:t>RF002 -Calcular o ângulo do objeto ao radar.</a:t>
+            </a:r>
+          </a:p>
+          <a:p>
+            <a:pPr lvl="0"/>
+            <a:r>
+              <a:rPr lang="pt-BR" sz="2400" dirty="0">
+                <a:effectLst/>
+              </a:rPr>
+              <a:t>RF003 -Calcular a localização de objetos até 40 cm, após essa distância ignorar todos objetos.</a:t>
+            </a:r>
+          </a:p>
+          <a:p>
+            <a:pPr lvl="0"/>
+            <a:r>
+              <a:rPr lang="pt-BR" sz="2400" dirty="0">
+                <a:effectLst/>
+              </a:rPr>
+              <a:t>RF004 -Provê uma interface gráfica de fácil usabilidade.</a:t>
+            </a:r>
+          </a:p>
+          <a:p>
+            <a:pPr lvl="0"/>
+            <a:r>
+              <a:rPr lang="pt-BR" sz="2400" dirty="0">
+                <a:effectLst/>
+              </a:rPr>
+              <a:t>RF005 -Ativação a distância via </a:t>
+            </a:r>
+            <a:r>
+              <a:rPr lang="pt-BR" sz="2400" dirty="0" err="1">
+                <a:effectLst/>
+              </a:rPr>
+              <a:t>bluetooth</a:t>
+            </a:r>
+            <a:r>
+              <a:rPr lang="pt-BR" sz="2400" dirty="0">
+                <a:effectLst/>
+              </a:rPr>
+              <a:t>.</a:t>
+            </a:r>
+          </a:p>
+          <a:p>
+            <a:pPr lvl="0"/>
+            <a:r>
+              <a:rPr lang="pt-BR" sz="2400" dirty="0">
+                <a:effectLst/>
+              </a:rPr>
+              <a:t>RF006 -Varrer a área correspondente a 180° pela horizontal.</a:t>
             </a:r>
           </a:p>
         </p:txBody>
@@ -7590,20 +6605,13 @@
     </p:spTree>
     <p:extLst>
       <p:ext uri="{BB962C8B-B14F-4D97-AF65-F5344CB8AC3E}">
-        <p14:creationId xmlns:p14="http://schemas.microsoft.com/office/powerpoint/2010/main" val="897766039"/>
+        <p14:creationId xmlns:p14="http://schemas.microsoft.com/office/powerpoint/2010/main" val="409355008"/>
       </p:ext>
     </p:extLst>
   </p:cSld>
   <p:clrMapOvr>
     <a:masterClrMapping/>
   </p:clrMapOvr>
-  <p:timing>
-    <p:tnLst>
-      <p:par>
-        <p:cTn id="1" dur="indefinite" restart="never" nodeType="tmRoot"/>
-      </p:par>
-    </p:tnLst>
-  </p:timing>
 </p:sld>
 </file>
 
@@ -7647,14 +6655,11 @@
           <a:lstStyle/>
           <a:p>
             <a:r>
-              <a:rPr lang="en-US" dirty="0">
+              <a:rPr lang="pt-BR" sz="2800" dirty="0">
                 <a:effectLst/>
               </a:rPr>
-              <a:t>4. METAS</a:t>
-            </a:r>
-            <a:endParaRPr lang="pt-BR" dirty="0">
-              <a:effectLst/>
-            </a:endParaRPr>
+              <a:t>5. ESCOPO DO PRODUTO</a:t>
+            </a:r>
           </a:p>
         </p:txBody>
       </p:sp>
@@ -7680,12 +6685,71 @@
           </a:bodyPr>
           <a:lstStyle/>
           <a:p>
-            <a:pPr algn="just"/>
             <a:r>
               <a:rPr lang="pt-BR" dirty="0">
                 <a:effectLst/>
               </a:rPr>
-              <a:t>Confeccionar um SISTEMA ANTI MISSIL para a F Liberal / F – 43 da Marinha do Brasil com o uso de RADAR ULTRASONICO capaz de neutralizar ataques contra a embarcação.</a:t>
+              <a:t>O produto deverá conter as seguintes características:</a:t>
+            </a:r>
+          </a:p>
+          <a:p>
+            <a:pPr marL="1006475" lvl="0" indent="-514350">
+              <a:buFont typeface="+mj-lt"/>
+              <a:buAutoNum type="romanUcPeriod"/>
+            </a:pPr>
+            <a:r>
+              <a:rPr lang="pt-BR" dirty="0">
+                <a:effectLst/>
+              </a:rPr>
+              <a:t>Cobertura de 180 graus contínua. </a:t>
+            </a:r>
+          </a:p>
+          <a:p>
+            <a:pPr marL="1006475" lvl="0" indent="-514350">
+              <a:buFont typeface="+mj-lt"/>
+              <a:buAutoNum type="romanUcPeriod"/>
+            </a:pPr>
+            <a:r>
+              <a:rPr lang="pt-BR" dirty="0">
+                <a:effectLst/>
+              </a:rPr>
+              <a:t>A rotação com cerca de 60rpm.</a:t>
+            </a:r>
+          </a:p>
+          <a:p>
+            <a:pPr marL="1006475" lvl="0" indent="-514350">
+              <a:buFont typeface="+mj-lt"/>
+              <a:buAutoNum type="romanUcPeriod"/>
+            </a:pPr>
+            <a:r>
+              <a:rPr lang="pt-BR" dirty="0">
+                <a:effectLst/>
+              </a:rPr>
+              <a:t>Menor razão de alarmes falsos e maior precisão de acompanhamento.</a:t>
+            </a:r>
+          </a:p>
+          <a:p>
+            <a:pPr marL="1006475" lvl="0" indent="-514350">
+              <a:buFont typeface="+mj-lt"/>
+              <a:buAutoNum type="romanUcPeriod"/>
+            </a:pPr>
+            <a:r>
+              <a:rPr lang="pt-BR" dirty="0">
+                <a:effectLst/>
+              </a:rPr>
+              <a:t>Capacidade de acompanhar alvos a mais de 60cm; acompanhar 1 a 5 alvos.</a:t>
+            </a:r>
+          </a:p>
+          <a:p>
+            <a:pPr marL="1006475" lvl="0" indent="-514350">
+              <a:buFont typeface="+mj-lt"/>
+              <a:buAutoNum type="romanUcPeriod"/>
+            </a:pPr>
+            <a:r>
+              <a:rPr lang="pt-BR" dirty="0">
+                <a:effectLst/>
+              </a:rPr>
+              <a:t>O alcance de 2 m.</a:t>
             </a:r>
           </a:p>
         </p:txBody>
@@ -7700,13 +6764,6 @@
   <p:clrMapOvr>
     <a:masterClrMapping/>
   </p:clrMapOvr>
-  <p:timing>
-    <p:tnLst>
-      <p:par>
-        <p:cTn id="1" dur="indefinite" restart="never" nodeType="tmRoot"/>
-      </p:par>
-    </p:tnLst>
-  </p:timing>
 </p:sld>
 </file>
 
@@ -7750,11 +6807,25 @@
           <a:lstStyle/>
           <a:p>
             <a:r>
-              <a:rPr lang="en-US" dirty="0">
+              <a:rPr lang="en-US" sz="2800" dirty="0">
                 <a:effectLst/>
               </a:rPr>
-              <a:t>5. PREMISSAS</a:t>
-            </a:r>
+              <a:t>6. </a:t>
+            </a:r>
+            <a:r>
+              <a:rPr lang="pt-BR" sz="2800" dirty="0">
+                <a:effectLst/>
+              </a:rPr>
+              <a:t>EXCLUSÕES DO PROJETO / FORA DO ESCOPO</a:t>
+            </a:r>
+            <a:br>
+              <a:rPr lang="pt-BR" sz="2800" dirty="0">
+                <a:effectLst/>
+              </a:rPr>
+            </a:br>
+            <a:endParaRPr lang="en-US" sz="2800" dirty="0">
+              <a:effectLst/>
+            </a:endParaRPr>
           </a:p>
         </p:txBody>
       </p:sp>
@@ -7780,57 +6851,11 @@
           </a:bodyPr>
           <a:lstStyle/>
           <a:p>
-            <a:pPr algn="just"/>
             <a:r>
               <a:rPr lang="pt-BR" dirty="0">
                 <a:effectLst/>
               </a:rPr>
-              <a:t>a.       Os departamentos de AUTOMAÇÃO e TI darão apoio ao projeto até a conclusão      do mesmo.</a:t>
-            </a:r>
-          </a:p>
-          <a:p>
-            <a:pPr algn="just"/>
-            <a:r>
-              <a:rPr lang="pt-BR" dirty="0">
-                <a:effectLst/>
-              </a:rPr>
-              <a:t>b.       Necessidades conflitantes com relação aos recursos do projeto e prioridades entre este e outros projetos serão resolvidas pelo PMO</a:t>
-            </a:r>
-          </a:p>
-          <a:p>
-            <a:pPr algn="just"/>
-            <a:r>
-              <a:rPr lang="pt-BR" dirty="0">
-                <a:effectLst/>
-              </a:rPr>
-              <a:t>c.       É necessário o apoio irrestrito de todos os envolvidos dentro da divisão. </a:t>
-            </a:r>
-            <a:endParaRPr lang="pt-BR" dirty="0" smtClean="0">
-              <a:effectLst/>
-            </a:endParaRPr>
-          </a:p>
-          <a:p>
-            <a:pPr algn="just"/>
-            <a:r>
-              <a:rPr lang="pt-BR" dirty="0" smtClean="0">
-                <a:effectLst/>
-              </a:rPr>
-              <a:t>d</a:t>
-            </a:r>
-            <a:r>
-              <a:rPr lang="pt-BR" dirty="0">
-                <a:effectLst/>
-              </a:rPr>
-              <a:t>.       Os membros da equipe terão dedicação exclusiva ao projeto.</a:t>
-            </a:r>
-          </a:p>
-          <a:p>
-            <a:pPr algn="just"/>
-            <a:r>
-              <a:rPr lang="pt-BR" dirty="0">
-                <a:effectLst/>
-              </a:rPr>
-              <a:t>e.     A equipe do projeto tem conhecimentos de gerenciamento de projetos, automação e informática.</a:t>
+              <a:t>Treinamento final para uso do RADAR por conta da DIRETORIA DA MARINHA DO BRASIL.</a:t>
             </a:r>
           </a:p>
         </p:txBody>
@@ -7845,13 +6870,6 @@
   <p:clrMapOvr>
     <a:masterClrMapping/>
   </p:clrMapOvr>
-  <p:timing>
-    <p:tnLst>
-      <p:par>
-        <p:cTn id="1" dur="indefinite" restart="never" nodeType="tmRoot"/>
-      </p:par>
-    </p:tnLst>
-  </p:timing>
 </p:sld>
 </file>
 
@@ -7895,10 +6913,10 @@
           <a:lstStyle/>
           <a:p>
             <a:r>
-              <a:rPr lang="en-US" dirty="0">
+              <a:rPr lang="en-US" sz="2800" dirty="0">
                 <a:effectLst/>
               </a:rPr>
-              <a:t>6. RESTRIÇÕES</a:t>
+              <a:t>7. RESTRIÇÕES</a:t>
             </a:r>
           </a:p>
         </p:txBody>
@@ -7929,37 +6947,10 @@
               <a:rPr lang="pt-BR" dirty="0">
                 <a:effectLst/>
               </a:rPr>
-              <a:t>a.       O orçamento é limitado a R$200.000,00.</a:t>
-            </a:r>
-          </a:p>
-          <a:p>
-            <a:r>
-              <a:rPr lang="pt-BR" dirty="0">
-                <a:effectLst/>
-              </a:rPr>
-              <a:t>b.       O prazo-limite é fim de 30 de junho de 2017.</a:t>
-            </a:r>
-          </a:p>
-          <a:p>
-            <a:r>
-              <a:rPr lang="pt-BR" dirty="0">
-                <a:effectLst/>
-              </a:rPr>
-              <a:t>c.       O projeto deve ser mantido dentro da esfera departamental, tendo apenas o contato externo com as áreas de TI e com a Diretoria da Marinha do Brasil.</a:t>
-            </a:r>
-          </a:p>
-          <a:p>
-            <a:r>
-              <a:rPr lang="pt-BR" dirty="0">
-                <a:effectLst/>
-              </a:rPr>
-              <a:t>d.       Não está prevista verba para terceirização.</a:t>
-            </a:r>
-          </a:p>
-          <a:p>
-            <a:pPr marL="0" indent="0">
-              <a:buNone/>
-            </a:pPr>
+              <a:t> O orçamento é limitado a R$200,00.</a:t>
+            </a:r>
+          </a:p>
+          <a:p>
             <a:endParaRPr lang="pt-BR" dirty="0">
               <a:effectLst/>
             </a:endParaRPr>
@@ -7976,13 +6967,6 @@
   <p:clrMapOvr>
     <a:masterClrMapping/>
   </p:clrMapOvr>
-  <p:timing>
-    <p:tnLst>
-      <p:par>
-        <p:cTn id="1" dur="indefinite" restart="never" nodeType="tmRoot"/>
-      </p:par>
-    </p:tnLst>
-  </p:timing>
 </p:sld>
 </file>
 
@@ -8021,16 +7005,30 @@
         </p:spPr>
         <p:txBody>
           <a:bodyPr>
-            <a:normAutofit/>
+            <a:normAutofit fontScale="90000"/>
           </a:bodyPr>
           <a:lstStyle/>
           <a:p>
             <a:r>
-              <a:rPr lang="en-US" dirty="0">
+              <a:rPr lang="en-US" sz="3100" dirty="0">
                 <a:effectLst/>
               </a:rPr>
-              <a:t>6. RESTRIÇÕES</a:t>
-            </a:r>
+              <a:t>8. </a:t>
+            </a:r>
+            <a:r>
+              <a:rPr lang="pt-BR" sz="3100" dirty="0">
+                <a:effectLst/>
+              </a:rPr>
+              <a:t>PREMISSAS</a:t>
+            </a:r>
+            <a:br>
+              <a:rPr lang="pt-BR" dirty="0">
+                <a:effectLst/>
+              </a:rPr>
+            </a:br>
+            <a:endParaRPr lang="en-US" dirty="0">
+              <a:effectLst/>
+            </a:endParaRPr>
           </a:p>
         </p:txBody>
       </p:sp>
@@ -8056,56 +7054,66 @@
           </a:bodyPr>
           <a:lstStyle/>
           <a:p>
-            <a:pPr algn="just"/>
-            <a:r>
-              <a:rPr lang="pt-BR" sz="2400" dirty="0">
+            <a:pPr lvl="0" algn="just"/>
+            <a:r>
+              <a:rPr lang="pt-BR" dirty="0">
                 <a:effectLst/>
               </a:rPr>
-              <a:t>- Documentação do projeto de acordo com os padrões do PMI</a:t>
-            </a:r>
-          </a:p>
-          <a:p>
-            <a:pPr algn="just"/>
-            <a:r>
-              <a:rPr lang="pt-BR" sz="2400" dirty="0">
+              <a:t>Os membros da equipe terão dedicação exclusiva ao projeto.</a:t>
+            </a:r>
+          </a:p>
+          <a:p>
+            <a:pPr lvl="0" algn="just"/>
+            <a:r>
+              <a:rPr lang="pt-BR" dirty="0">
                 <a:effectLst/>
               </a:rPr>
-              <a:t>- Avaliação detalhada da situação atual</a:t>
-            </a:r>
-          </a:p>
-          <a:p>
-            <a:pPr algn="just"/>
-            <a:r>
-              <a:rPr lang="pt-BR" sz="2400" dirty="0">
+              <a:t>A equipe do projeto tem conhecimentos de gerenciamento de projetos, automação e informática.</a:t>
+            </a:r>
+          </a:p>
+          <a:p>
+            <a:pPr lvl="0" algn="just"/>
+            <a:r>
+              <a:rPr lang="pt-BR" dirty="0">
                 <a:effectLst/>
               </a:rPr>
-              <a:t>- Entrevistas com Diretoria da Marinha e Departamentos da MB correlatos ao projeto.</a:t>
-            </a:r>
-          </a:p>
-          <a:p>
-            <a:pPr algn="just"/>
-            <a:r>
-              <a:rPr lang="pt-BR" sz="2400" dirty="0">
+              <a:t>HARDWARE:  Arduino Uno R3+Cabo </a:t>
+            </a:r>
+            <a:r>
+              <a:rPr lang="pt-BR" dirty="0" err="1">
                 <a:effectLst/>
               </a:rPr>
-              <a:t>- Relatório com recomendações de soluções para o problema.</a:t>
-            </a:r>
-          </a:p>
-          <a:p>
-            <a:pPr algn="just"/>
-            <a:r>
-              <a:rPr lang="pt-BR" sz="2400" dirty="0">
+              <a:t>Usb+Jumpers+Protoboard</a:t>
+            </a:r>
+            <a:r>
+              <a:rPr lang="pt-BR" dirty="0">
                 <a:effectLst/>
               </a:rPr>
-              <a:t>- Apresentação para a Diretoria da Marinha e Conselho do Estado Maior. </a:t>
-            </a:r>
-          </a:p>
-          <a:p>
-            <a:pPr marL="0" indent="0" algn="just">
-              <a:buNone/>
-            </a:pPr>
-            <a:r>
-              <a:rPr lang="pt-BR" sz="2400" dirty="0">
+              <a:t> (35 reais), Módulo Bluetooth Serial Hc-06  (8 reais) , Sensor de Distância Ultrassônico HC-SR04 (8 reais) ,  Micro Servo Motor 9g Sg90 180º Tower Pro (9 reais).</a:t>
+            </a:r>
+          </a:p>
+          <a:p>
+            <a:pPr lvl="0" algn="just"/>
+            <a:r>
+              <a:rPr lang="pt-BR" dirty="0">
+                <a:effectLst/>
+              </a:rPr>
+              <a:t>SOFTWARES:  Para a programação do microcontrolador: IDE Arduino, Para a programação do aplicativo : MIT APP INVENTOR 2 , Para a programação da interface gráfica : IDE </a:t>
+            </a:r>
+            <a:r>
+              <a:rPr lang="pt-BR" dirty="0" err="1">
+                <a:effectLst/>
+              </a:rPr>
+              <a:t>Processing</a:t>
+            </a:r>
+            <a:endParaRPr lang="pt-BR" dirty="0">
+              <a:effectLst/>
+            </a:endParaRPr>
+          </a:p>
+          <a:p>
+            <a:pPr algn="just"/>
+            <a:r>
+              <a:rPr lang="pt-BR" dirty="0">
                 <a:effectLst/>
               </a:rPr>
               <a:t> </a:t>
@@ -8131,13 +7139,6 @@
   <p:clrMapOvr>
     <a:masterClrMapping/>
   </p:clrMapOvr>
-  <p:timing>
-    <p:tnLst>
-      <p:par>
-        <p:cTn id="1" dur="indefinite" restart="never" nodeType="tmRoot"/>
-      </p:par>
-    </p:tnLst>
-  </p:timing>
 </p:sld>
 </file>
 
@@ -8184,7 +7185,7 @@
     </a:clrScheme>
     <a:fontScheme name="Damask">
       <a:majorFont>
-        <a:latin typeface="Bookman Old Style"/>
+        <a:latin typeface="Bookman Old Style" panose="02050604050505020204"/>
         <a:ea typeface=""/>
         <a:cs typeface=""/>
         <a:font script="Jpan" typeface="ＭＳ Ｐゴシック"/>
@@ -8219,7 +7220,7 @@
         <a:font script="Geor" typeface="Sylfaen"/>
       </a:majorFont>
       <a:minorFont>
-        <a:latin typeface="Rockwell"/>
+        <a:latin typeface="Rockwell" panose="02060603020205020403"/>
         <a:ea typeface=""/>
         <a:cs typeface=""/>
         <a:font script="Jpan" typeface="ＭＳ Ｐゴシック"/>
@@ -8391,7 +7392,7 @@
   <a:extraClrSchemeLst/>
   <a:extLst>
     <a:ext uri="{05A4C25C-085E-4340-85A3-A5531E510DB2}">
-      <thm15:themeFamily xmlns="" xmlns:thm15="http://schemas.microsoft.com/office/thememl/2012/main" name="Damask" id="{F9A299A0-33D0-4E0F-9F3F-7163E3744208}" vid="{746EEEEA-FB6A-406B-B510-531588D54811}"/>
+      <thm15:themeFamily xmlns:thm15="http://schemas.microsoft.com/office/thememl/2012/main" name="Damask" id="{F9A299A0-33D0-4E0F-9F3F-7163E3744208}" vid="{746EEEEA-FB6A-406B-B510-531588D54811}"/>
     </a:ext>
   </a:extLst>
 </a:theme>

</xml_diff>